<commit_message>
Added technology evaluation slide
</commit_message>
<xml_diff>
--- a/documentation/Sprint2_PAA.pptx
+++ b/documentation/Sprint2_PAA.pptx
@@ -4,6 +4,9 @@
   <p:sldMasterIdLst>
     <p:sldMasterId id="2147483738" r:id="rId1"/>
   </p:sldMasterIdLst>
+  <p:notesMasterIdLst>
+    <p:notesMasterId r:id="rId8"/>
+  </p:notesMasterIdLst>
   <p:sldIdLst>
     <p:sldId id="256" r:id="rId2"/>
     <p:sldId id="265" r:id="rId3"/>
@@ -2824,6 +2827,440 @@
 </dgm:styleDef>
 </file>
 
+<file path=ppt/notesMasters/notesMaster1.xml><?xml version="1.0" encoding="utf-8"?>
+<p:notesMaster xmlns:a="http://schemas.openxmlformats.org/drawingml/2006/main" xmlns:r="http://schemas.openxmlformats.org/officeDocument/2006/relationships" xmlns:p="http://schemas.openxmlformats.org/presentationml/2006/main">
+  <p:cSld>
+    <p:bg>
+      <p:bgRef idx="1001">
+        <a:schemeClr val="bg1"/>
+      </p:bgRef>
+    </p:bg>
+    <p:spTree>
+      <p:nvGrpSpPr>
+        <p:cNvPr id="1" name=""/>
+        <p:cNvGrpSpPr/>
+        <p:nvPr/>
+      </p:nvGrpSpPr>
+      <p:grpSpPr>
+        <a:xfrm>
+          <a:off x="0" y="0"/>
+          <a:ext cx="0" cy="0"/>
+          <a:chOff x="0" y="0"/>
+          <a:chExt cx="0" cy="0"/>
+        </a:xfrm>
+      </p:grpSpPr>
+      <p:sp>
+        <p:nvSpPr>
+          <p:cNvPr id="2" name="Header Placeholder 1"/>
+          <p:cNvSpPr>
+            <a:spLocks noGrp="1"/>
+          </p:cNvSpPr>
+          <p:nvPr>
+            <p:ph type="hdr" sz="quarter"/>
+          </p:nvPr>
+        </p:nvSpPr>
+        <p:spPr>
+          <a:xfrm>
+            <a:off x="0" y="0"/>
+            <a:ext cx="2971800" cy="458788"/>
+          </a:xfrm>
+          <a:prstGeom prst="rect">
+            <a:avLst/>
+          </a:prstGeom>
+        </p:spPr>
+        <p:txBody>
+          <a:bodyPr vert="horz" lIns="91440" tIns="45720" rIns="91440" bIns="45720" rtlCol="0"/>
+          <a:lstStyle>
+            <a:lvl1pPr algn="l">
+              <a:defRPr sz="1200"/>
+            </a:lvl1pPr>
+          </a:lstStyle>
+          <a:p>
+            <a:endParaRPr lang="en-GB"/>
+          </a:p>
+        </p:txBody>
+      </p:sp>
+      <p:sp>
+        <p:nvSpPr>
+          <p:cNvPr id="3" name="Date Placeholder 2"/>
+          <p:cNvSpPr>
+            <a:spLocks noGrp="1"/>
+          </p:cNvSpPr>
+          <p:nvPr>
+            <p:ph type="dt" idx="1"/>
+          </p:nvPr>
+        </p:nvSpPr>
+        <p:spPr>
+          <a:xfrm>
+            <a:off x="3884613" y="0"/>
+            <a:ext cx="2971800" cy="458788"/>
+          </a:xfrm>
+          <a:prstGeom prst="rect">
+            <a:avLst/>
+          </a:prstGeom>
+        </p:spPr>
+        <p:txBody>
+          <a:bodyPr vert="horz" lIns="91440" tIns="45720" rIns="91440" bIns="45720" rtlCol="0"/>
+          <a:lstStyle>
+            <a:lvl1pPr algn="r">
+              <a:defRPr sz="1200"/>
+            </a:lvl1pPr>
+          </a:lstStyle>
+          <a:p>
+            <a:fld id="{5D219B12-85DE-474F-82A6-F2BBEFB2572A}" type="datetimeFigureOut">
+              <a:rPr lang="en-GB" smtClean="0"/>
+              <a:t>25/10/2021</a:t>
+            </a:fld>
+            <a:endParaRPr lang="en-GB"/>
+          </a:p>
+        </p:txBody>
+      </p:sp>
+      <p:sp>
+        <p:nvSpPr>
+          <p:cNvPr id="4" name="Slide Image Placeholder 3"/>
+          <p:cNvSpPr>
+            <a:spLocks noGrp="1" noRot="1" noChangeAspect="1"/>
+          </p:cNvSpPr>
+          <p:nvPr>
+            <p:ph type="sldImg" idx="2"/>
+          </p:nvPr>
+        </p:nvSpPr>
+        <p:spPr>
+          <a:xfrm>
+            <a:off x="685800" y="1143000"/>
+            <a:ext cx="5486400" cy="3086100"/>
+          </a:xfrm>
+          <a:prstGeom prst="rect">
+            <a:avLst/>
+          </a:prstGeom>
+          <a:noFill/>
+          <a:ln w="12700">
+            <a:solidFill>
+              <a:prstClr val="black"/>
+            </a:solidFill>
+          </a:ln>
+        </p:spPr>
+        <p:txBody>
+          <a:bodyPr vert="horz" lIns="91440" tIns="45720" rIns="91440" bIns="45720" rtlCol="0" anchor="ctr"/>
+          <a:lstStyle/>
+          <a:p>
+            <a:endParaRPr lang="en-GB"/>
+          </a:p>
+        </p:txBody>
+      </p:sp>
+      <p:sp>
+        <p:nvSpPr>
+          <p:cNvPr id="5" name="Notes Placeholder 4"/>
+          <p:cNvSpPr>
+            <a:spLocks noGrp="1"/>
+          </p:cNvSpPr>
+          <p:nvPr>
+            <p:ph type="body" sz="quarter" idx="3"/>
+          </p:nvPr>
+        </p:nvSpPr>
+        <p:spPr>
+          <a:xfrm>
+            <a:off x="685800" y="4400550"/>
+            <a:ext cx="5486400" cy="3600450"/>
+          </a:xfrm>
+          <a:prstGeom prst="rect">
+            <a:avLst/>
+          </a:prstGeom>
+        </p:spPr>
+        <p:txBody>
+          <a:bodyPr vert="horz" lIns="91440" tIns="45720" rIns="91440" bIns="45720" rtlCol="0"/>
+          <a:lstStyle/>
+          <a:p>
+            <a:pPr lvl="0"/>
+            <a:r>
+              <a:rPr lang="en-US"/>
+              <a:t>Click to edit Master text styles</a:t>
+            </a:r>
+          </a:p>
+          <a:p>
+            <a:pPr lvl="1"/>
+            <a:r>
+              <a:rPr lang="en-US"/>
+              <a:t>Second level</a:t>
+            </a:r>
+          </a:p>
+          <a:p>
+            <a:pPr lvl="2"/>
+            <a:r>
+              <a:rPr lang="en-US"/>
+              <a:t>Third level</a:t>
+            </a:r>
+          </a:p>
+          <a:p>
+            <a:pPr lvl="3"/>
+            <a:r>
+              <a:rPr lang="en-US"/>
+              <a:t>Fourth level</a:t>
+            </a:r>
+          </a:p>
+          <a:p>
+            <a:pPr lvl="4"/>
+            <a:r>
+              <a:rPr lang="en-US"/>
+              <a:t>Fifth level</a:t>
+            </a:r>
+            <a:endParaRPr lang="en-GB"/>
+          </a:p>
+        </p:txBody>
+      </p:sp>
+      <p:sp>
+        <p:nvSpPr>
+          <p:cNvPr id="6" name="Footer Placeholder 5"/>
+          <p:cNvSpPr>
+            <a:spLocks noGrp="1"/>
+          </p:cNvSpPr>
+          <p:nvPr>
+            <p:ph type="ftr" sz="quarter" idx="4"/>
+          </p:nvPr>
+        </p:nvSpPr>
+        <p:spPr>
+          <a:xfrm>
+            <a:off x="0" y="8685213"/>
+            <a:ext cx="2971800" cy="458787"/>
+          </a:xfrm>
+          <a:prstGeom prst="rect">
+            <a:avLst/>
+          </a:prstGeom>
+        </p:spPr>
+        <p:txBody>
+          <a:bodyPr vert="horz" lIns="91440" tIns="45720" rIns="91440" bIns="45720" rtlCol="0" anchor="b"/>
+          <a:lstStyle>
+            <a:lvl1pPr algn="l">
+              <a:defRPr sz="1200"/>
+            </a:lvl1pPr>
+          </a:lstStyle>
+          <a:p>
+            <a:endParaRPr lang="en-GB"/>
+          </a:p>
+        </p:txBody>
+      </p:sp>
+      <p:sp>
+        <p:nvSpPr>
+          <p:cNvPr id="7" name="Slide Number Placeholder 6"/>
+          <p:cNvSpPr>
+            <a:spLocks noGrp="1"/>
+          </p:cNvSpPr>
+          <p:nvPr>
+            <p:ph type="sldNum" sz="quarter" idx="5"/>
+          </p:nvPr>
+        </p:nvSpPr>
+        <p:spPr>
+          <a:xfrm>
+            <a:off x="3884613" y="8685213"/>
+            <a:ext cx="2971800" cy="458787"/>
+          </a:xfrm>
+          <a:prstGeom prst="rect">
+            <a:avLst/>
+          </a:prstGeom>
+        </p:spPr>
+        <p:txBody>
+          <a:bodyPr vert="horz" lIns="91440" tIns="45720" rIns="91440" bIns="45720" rtlCol="0" anchor="b"/>
+          <a:lstStyle>
+            <a:lvl1pPr algn="r">
+              <a:defRPr sz="1200"/>
+            </a:lvl1pPr>
+          </a:lstStyle>
+          <a:p>
+            <a:fld id="{E7F9E5FC-C6E5-41A9-8D74-144FA0CB37AF}" type="slidenum">
+              <a:rPr lang="en-GB" smtClean="0"/>
+              <a:t>‹#›</a:t>
+            </a:fld>
+            <a:endParaRPr lang="en-GB"/>
+          </a:p>
+        </p:txBody>
+      </p:sp>
+    </p:spTree>
+    <p:extLst>
+      <p:ext uri="{BB962C8B-B14F-4D97-AF65-F5344CB8AC3E}">
+        <p14:creationId xmlns:p14="http://schemas.microsoft.com/office/powerpoint/2010/main" val="3632261625"/>
+      </p:ext>
+    </p:extLst>
+  </p:cSld>
+  <p:clrMap bg1="lt1" tx1="dk1" bg2="lt2" tx2="dk2" accent1="accent1" accent2="accent2" accent3="accent3" accent4="accent4" accent5="accent5" accent6="accent6" hlink="hlink" folHlink="folHlink"/>
+  <p:notesStyle>
+    <a:lvl1pPr marL="0" algn="l" defTabSz="914400" rtl="0" eaLnBrk="1" latinLnBrk="0" hangingPunct="1">
+      <a:defRPr sz="1200" kern="1200">
+        <a:solidFill>
+          <a:schemeClr val="tx1"/>
+        </a:solidFill>
+        <a:latin typeface="+mn-lt"/>
+        <a:ea typeface="+mn-ea"/>
+        <a:cs typeface="+mn-cs"/>
+      </a:defRPr>
+    </a:lvl1pPr>
+    <a:lvl2pPr marL="457200" algn="l" defTabSz="914400" rtl="0" eaLnBrk="1" latinLnBrk="0" hangingPunct="1">
+      <a:defRPr sz="1200" kern="1200">
+        <a:solidFill>
+          <a:schemeClr val="tx1"/>
+        </a:solidFill>
+        <a:latin typeface="+mn-lt"/>
+        <a:ea typeface="+mn-ea"/>
+        <a:cs typeface="+mn-cs"/>
+      </a:defRPr>
+    </a:lvl2pPr>
+    <a:lvl3pPr marL="914400" algn="l" defTabSz="914400" rtl="0" eaLnBrk="1" latinLnBrk="0" hangingPunct="1">
+      <a:defRPr sz="1200" kern="1200">
+        <a:solidFill>
+          <a:schemeClr val="tx1"/>
+        </a:solidFill>
+        <a:latin typeface="+mn-lt"/>
+        <a:ea typeface="+mn-ea"/>
+        <a:cs typeface="+mn-cs"/>
+      </a:defRPr>
+    </a:lvl3pPr>
+    <a:lvl4pPr marL="1371600" algn="l" defTabSz="914400" rtl="0" eaLnBrk="1" latinLnBrk="0" hangingPunct="1">
+      <a:defRPr sz="1200" kern="1200">
+        <a:solidFill>
+          <a:schemeClr val="tx1"/>
+        </a:solidFill>
+        <a:latin typeface="+mn-lt"/>
+        <a:ea typeface="+mn-ea"/>
+        <a:cs typeface="+mn-cs"/>
+      </a:defRPr>
+    </a:lvl4pPr>
+    <a:lvl5pPr marL="1828800" algn="l" defTabSz="914400" rtl="0" eaLnBrk="1" latinLnBrk="0" hangingPunct="1">
+      <a:defRPr sz="1200" kern="1200">
+        <a:solidFill>
+          <a:schemeClr val="tx1"/>
+        </a:solidFill>
+        <a:latin typeface="+mn-lt"/>
+        <a:ea typeface="+mn-ea"/>
+        <a:cs typeface="+mn-cs"/>
+      </a:defRPr>
+    </a:lvl5pPr>
+    <a:lvl6pPr marL="2286000" algn="l" defTabSz="914400" rtl="0" eaLnBrk="1" latinLnBrk="0" hangingPunct="1">
+      <a:defRPr sz="1200" kern="1200">
+        <a:solidFill>
+          <a:schemeClr val="tx1"/>
+        </a:solidFill>
+        <a:latin typeface="+mn-lt"/>
+        <a:ea typeface="+mn-ea"/>
+        <a:cs typeface="+mn-cs"/>
+      </a:defRPr>
+    </a:lvl6pPr>
+    <a:lvl7pPr marL="2743200" algn="l" defTabSz="914400" rtl="0" eaLnBrk="1" latinLnBrk="0" hangingPunct="1">
+      <a:defRPr sz="1200" kern="1200">
+        <a:solidFill>
+          <a:schemeClr val="tx1"/>
+        </a:solidFill>
+        <a:latin typeface="+mn-lt"/>
+        <a:ea typeface="+mn-ea"/>
+        <a:cs typeface="+mn-cs"/>
+      </a:defRPr>
+    </a:lvl7pPr>
+    <a:lvl8pPr marL="3200400" algn="l" defTabSz="914400" rtl="0" eaLnBrk="1" latinLnBrk="0" hangingPunct="1">
+      <a:defRPr sz="1200" kern="1200">
+        <a:solidFill>
+          <a:schemeClr val="tx1"/>
+        </a:solidFill>
+        <a:latin typeface="+mn-lt"/>
+        <a:ea typeface="+mn-ea"/>
+        <a:cs typeface="+mn-cs"/>
+      </a:defRPr>
+    </a:lvl8pPr>
+    <a:lvl9pPr marL="3657600" algn="l" defTabSz="914400" rtl="0" eaLnBrk="1" latinLnBrk="0" hangingPunct="1">
+      <a:defRPr sz="1200" kern="1200">
+        <a:solidFill>
+          <a:schemeClr val="tx1"/>
+        </a:solidFill>
+        <a:latin typeface="+mn-lt"/>
+        <a:ea typeface="+mn-ea"/>
+        <a:cs typeface="+mn-cs"/>
+      </a:defRPr>
+    </a:lvl9pPr>
+  </p:notesStyle>
+</p:notesMaster>
+</file>
+
+<file path=ppt/notesSlides/notesSlide1.xml><?xml version="1.0" encoding="utf-8"?>
+<p:notes xmlns:a="http://schemas.openxmlformats.org/drawingml/2006/main" xmlns:r="http://schemas.openxmlformats.org/officeDocument/2006/relationships" xmlns:p="http://schemas.openxmlformats.org/presentationml/2006/main">
+  <p:cSld>
+    <p:spTree>
+      <p:nvGrpSpPr>
+        <p:cNvPr id="1" name=""/>
+        <p:cNvGrpSpPr/>
+        <p:nvPr/>
+      </p:nvGrpSpPr>
+      <p:grpSpPr>
+        <a:xfrm>
+          <a:off x="0" y="0"/>
+          <a:ext cx="0" cy="0"/>
+          <a:chOff x="0" y="0"/>
+          <a:chExt cx="0" cy="0"/>
+        </a:xfrm>
+      </p:grpSpPr>
+      <p:sp>
+        <p:nvSpPr>
+          <p:cNvPr id="2" name="Slide Image Placeholder 1"/>
+          <p:cNvSpPr>
+            <a:spLocks noGrp="1" noRot="1" noChangeAspect="1"/>
+          </p:cNvSpPr>
+          <p:nvPr>
+            <p:ph type="sldImg"/>
+          </p:nvPr>
+        </p:nvSpPr>
+        <p:spPr/>
+      </p:sp>
+      <p:sp>
+        <p:nvSpPr>
+          <p:cNvPr id="3" name="Notes Placeholder 2"/>
+          <p:cNvSpPr>
+            <a:spLocks noGrp="1"/>
+          </p:cNvSpPr>
+          <p:nvPr>
+            <p:ph type="body" idx="1"/>
+          </p:nvPr>
+        </p:nvSpPr>
+        <p:spPr/>
+        <p:txBody>
+          <a:bodyPr/>
+          <a:lstStyle/>
+          <a:p>
+            <a:endParaRPr lang="en-GB" dirty="0"/>
+          </a:p>
+        </p:txBody>
+      </p:sp>
+      <p:sp>
+        <p:nvSpPr>
+          <p:cNvPr id="4" name="Slide Number Placeholder 3"/>
+          <p:cNvSpPr>
+            <a:spLocks noGrp="1"/>
+          </p:cNvSpPr>
+          <p:nvPr>
+            <p:ph type="sldNum" sz="quarter" idx="5"/>
+          </p:nvPr>
+        </p:nvSpPr>
+        <p:spPr/>
+        <p:txBody>
+          <a:bodyPr/>
+          <a:lstStyle/>
+          <a:p>
+            <a:fld id="{E7F9E5FC-C6E5-41A9-8D74-144FA0CB37AF}" type="slidenum">
+              <a:rPr lang="en-GB" smtClean="0"/>
+              <a:t>4</a:t>
+            </a:fld>
+            <a:endParaRPr lang="en-GB"/>
+          </a:p>
+        </p:txBody>
+      </p:sp>
+    </p:spTree>
+    <p:extLst>
+      <p:ext uri="{BB962C8B-B14F-4D97-AF65-F5344CB8AC3E}">
+        <p14:creationId xmlns:p14="http://schemas.microsoft.com/office/powerpoint/2010/main" val="3106171082"/>
+      </p:ext>
+    </p:extLst>
+  </p:cSld>
+  <p:clrMapOvr>
+    <a:masterClrMapping/>
+  </p:clrMapOvr>
+</p:notes>
+</file>
+
 <file path=ppt/slideLayouts/slideLayout1.xml><?xml version="1.0" encoding="utf-8"?>
 <p:sldLayout xmlns:a="http://schemas.openxmlformats.org/drawingml/2006/main" xmlns:r="http://schemas.openxmlformats.org/officeDocument/2006/relationships" xmlns:p="http://schemas.openxmlformats.org/presentationml/2006/main" type="title" preserve="1">
   <p:cSld name="Title Slide">
@@ -2975,7 +3412,7 @@
           <a:p>
             <a:fld id="{8C28A28C-4C6A-46EA-90C0-4EE0B89CC5C7}" type="datetimeFigureOut">
               <a:rPr lang="en-US" smtClean="0"/>
-              <a:t>10/20/21</a:t>
+              <a:t>10/25/2021</a:t>
             </a:fld>
             <a:endParaRPr lang="en-US" dirty="0"/>
           </a:p>
@@ -3173,7 +3610,7 @@
           <a:p>
             <a:fld id="{8C28A28C-4C6A-46EA-90C0-4EE0B89CC5C7}" type="datetimeFigureOut">
               <a:rPr lang="en-US" smtClean="0"/>
-              <a:t>10/20/21</a:t>
+              <a:t>10/25/2021</a:t>
             </a:fld>
             <a:endParaRPr lang="en-US"/>
           </a:p>
@@ -3381,7 +3818,7 @@
           <a:p>
             <a:fld id="{8C28A28C-4C6A-46EA-90C0-4EE0B89CC5C7}" type="datetimeFigureOut">
               <a:rPr lang="en-US" smtClean="0"/>
-              <a:t>10/20/21</a:t>
+              <a:t>10/25/2021</a:t>
             </a:fld>
             <a:endParaRPr lang="en-US"/>
           </a:p>
@@ -3579,7 +4016,7 @@
           <a:p>
             <a:fld id="{8C28A28C-4C6A-46EA-90C0-4EE0B89CC5C7}" type="datetimeFigureOut">
               <a:rPr lang="en-US" smtClean="0"/>
-              <a:t>10/20/21</a:t>
+              <a:t>10/25/2021</a:t>
             </a:fld>
             <a:endParaRPr lang="en-US"/>
           </a:p>
@@ -3856,7 +4293,7 @@
           <a:p>
             <a:fld id="{8C28A28C-4C6A-46EA-90C0-4EE0B89CC5C7}" type="datetimeFigureOut">
               <a:rPr lang="en-US" smtClean="0"/>
-              <a:t>10/20/21</a:t>
+              <a:t>10/25/2021</a:t>
             </a:fld>
             <a:endParaRPr lang="en-US"/>
           </a:p>
@@ -4121,7 +4558,7 @@
           <a:p>
             <a:fld id="{8C28A28C-4C6A-46EA-90C0-4EE0B89CC5C7}" type="datetimeFigureOut">
               <a:rPr lang="en-US" smtClean="0"/>
-              <a:t>10/20/21</a:t>
+              <a:t>10/25/2021</a:t>
             </a:fld>
             <a:endParaRPr lang="en-US"/>
           </a:p>
@@ -4533,7 +4970,7 @@
           <a:p>
             <a:fld id="{8C28A28C-4C6A-46EA-90C0-4EE0B89CC5C7}" type="datetimeFigureOut">
               <a:rPr lang="en-US" smtClean="0"/>
-              <a:t>10/20/21</a:t>
+              <a:t>10/25/2021</a:t>
             </a:fld>
             <a:endParaRPr lang="en-US"/>
           </a:p>
@@ -4674,7 +5111,7 @@
           <a:p>
             <a:fld id="{8C28A28C-4C6A-46EA-90C0-4EE0B89CC5C7}" type="datetimeFigureOut">
               <a:rPr lang="en-US" smtClean="0"/>
-              <a:t>10/20/21</a:t>
+              <a:t>10/25/2021</a:t>
             </a:fld>
             <a:endParaRPr lang="en-US"/>
           </a:p>
@@ -4787,7 +5224,7 @@
           <a:p>
             <a:fld id="{8C28A28C-4C6A-46EA-90C0-4EE0B89CC5C7}" type="datetimeFigureOut">
               <a:rPr lang="en-US" smtClean="0"/>
-              <a:t>10/20/21</a:t>
+              <a:t>10/25/2021</a:t>
             </a:fld>
             <a:endParaRPr lang="en-US"/>
           </a:p>
@@ -5100,7 +5537,7 @@
           <a:p>
             <a:fld id="{8C28A28C-4C6A-46EA-90C0-4EE0B89CC5C7}" type="datetimeFigureOut">
               <a:rPr lang="en-US" smtClean="0"/>
-              <a:t>10/20/21</a:t>
+              <a:t>10/25/2021</a:t>
             </a:fld>
             <a:endParaRPr lang="en-US"/>
           </a:p>
@@ -5388,7 +5825,7 @@
           <a:p>
             <a:fld id="{8C28A28C-4C6A-46EA-90C0-4EE0B89CC5C7}" type="datetimeFigureOut">
               <a:rPr lang="en-US" smtClean="0"/>
-              <a:t>10/20/21</a:t>
+              <a:t>10/25/2021</a:t>
             </a:fld>
             <a:endParaRPr lang="en-US"/>
           </a:p>
@@ -5743,7 +6180,7 @@
             <a:fld id="{8C28A28C-4C6A-46EA-90C0-4EE0B89CC5C7}" type="datetimeFigureOut">
               <a:rPr lang="en-US" smtClean="0"/>
               <a:pPr/>
-              <a:t>10/20/21</a:t>
+              <a:t>10/25/2021</a:t>
             </a:fld>
             <a:endParaRPr lang="en-US" dirty="0"/>
           </a:p>
@@ -6996,28 +7433,381 @@
           </a:p>
         </p:txBody>
       </p:sp>
-      <p:sp>
-        <p:nvSpPr>
-          <p:cNvPr id="3" name="Content Placeholder 2">
+      <p:graphicFrame>
+        <p:nvGraphicFramePr>
+          <p:cNvPr id="11" name="Table 11">
             <a:extLst>
               <a:ext uri="{FF2B5EF4-FFF2-40B4-BE49-F238E27FC236}">
-                <a16:creationId xmlns:a16="http://schemas.microsoft.com/office/drawing/2014/main" id="{5D1E8BAC-12C6-1C45-81E1-FB1DE0F2F3E8}"/>
+                <a16:creationId xmlns:a16="http://schemas.microsoft.com/office/drawing/2014/main" id="{F41F6B7D-8501-4DED-9376-95D264F2C17E}"/>
               </a:ext>
             </a:extLst>
           </p:cNvPr>
-          <p:cNvSpPr>
-            <a:spLocks noGrp="1"/>
-          </p:cNvSpPr>
+          <p:cNvGraphicFramePr>
+            <a:graphicFrameLocks noGrp="1"/>
+          </p:cNvGraphicFramePr>
           <p:nvPr>
             <p:ph idx="1"/>
-          </p:nvPr>
-        </p:nvSpPr>
-        <p:spPr/>
-        <p:txBody>
-          <a:bodyPr/>
+            <p:extLst>
+              <p:ext uri="{D42A27DB-BD31-4B8C-83A1-F6EECF244321}">
+                <p14:modId xmlns:p14="http://schemas.microsoft.com/office/powerpoint/2010/main" val="4248744399"/>
+              </p:ext>
+            </p:extLst>
+          </p:nvPr>
+        </p:nvGraphicFramePr>
+        <p:xfrm>
+          <a:off x="1077913" y="2427288"/>
+          <a:ext cx="9778254" cy="3672840"/>
+        </p:xfrm>
+        <a:graphic>
+          <a:graphicData uri="http://schemas.openxmlformats.org/drawingml/2006/table">
+            <a:tbl>
+              <a:tblPr firstCol="1" bandRow="1">
+                <a:tableStyleId>{5C22544A-7EE6-4342-B048-85BDC9FD1C3A}</a:tableStyleId>
+              </a:tblPr>
+              <a:tblGrid>
+                <a:gridCol w="2728032">
+                  <a:extLst>
+                    <a:ext uri="{9D8B030D-6E8A-4147-A177-3AD203B41FA5}">
+                      <a16:colId xmlns:a16="http://schemas.microsoft.com/office/drawing/2014/main" val="2942096635"/>
+                    </a:ext>
+                  </a:extLst>
+                </a:gridCol>
+                <a:gridCol w="7050222">
+                  <a:extLst>
+                    <a:ext uri="{9D8B030D-6E8A-4147-A177-3AD203B41FA5}">
+                      <a16:colId xmlns:a16="http://schemas.microsoft.com/office/drawing/2014/main" val="2381315393"/>
+                    </a:ext>
+                  </a:extLst>
+                </a:gridCol>
+              </a:tblGrid>
+              <a:tr h="370840">
+                <a:tc>
+                  <a:txBody>
+                    <a:bodyPr/>
+                    <a:lstStyle/>
+                    <a:p>
+                      <a:pPr algn="ctr"/>
+                      <a:r>
+                        <a:rPr lang="en-GB" b="1" dirty="0"/>
+                        <a:t>MySQL 8</a:t>
+                      </a:r>
+                    </a:p>
+                  </a:txBody>
+                  <a:tcPr/>
+                </a:tc>
+                <a:tc>
+                  <a:txBody>
+                    <a:bodyPr/>
+                    <a:lstStyle/>
+                    <a:p>
+                      <a:r>
+                        <a:rPr lang="en-GB" dirty="0"/>
+                        <a:t>Version 5.7 is EOL in 2023 version 8 is production ready, has the benefit of being able to handle UUID’s</a:t>
+                      </a:r>
+                    </a:p>
+                  </a:txBody>
+                  <a:tcPr/>
+                </a:tc>
+                <a:extLst>
+                  <a:ext uri="{0D108BD9-81ED-4DB2-BD59-A6C34878D82A}">
+                    <a16:rowId xmlns:a16="http://schemas.microsoft.com/office/drawing/2014/main" val="4012133355"/>
+                  </a:ext>
+                </a:extLst>
+              </a:tr>
+              <a:tr h="370840">
+                <a:tc>
+                  <a:txBody>
+                    <a:bodyPr/>
+                    <a:lstStyle/>
+                    <a:p>
+                      <a:pPr algn="ctr"/>
+                      <a:r>
+                        <a:rPr lang="en-GB" b="1" dirty="0"/>
+                        <a:t>GitHub Actions</a:t>
+                      </a:r>
+                    </a:p>
+                  </a:txBody>
+                  <a:tcPr/>
+                </a:tc>
+                <a:tc>
+                  <a:txBody>
+                    <a:bodyPr/>
+                    <a:lstStyle/>
+                    <a:p>
+                      <a:r>
+                        <a:rPr lang="en-GB" dirty="0"/>
+                        <a:t>CI/CD for build, test and deploy</a:t>
+                      </a:r>
+                    </a:p>
+                  </a:txBody>
+                  <a:tcPr/>
+                </a:tc>
+                <a:extLst>
+                  <a:ext uri="{0D108BD9-81ED-4DB2-BD59-A6C34878D82A}">
+                    <a16:rowId xmlns:a16="http://schemas.microsoft.com/office/drawing/2014/main" val="481127041"/>
+                  </a:ext>
+                </a:extLst>
+              </a:tr>
+              <a:tr h="370840">
+                <a:tc>
+                  <a:txBody>
+                    <a:bodyPr/>
+                    <a:lstStyle/>
+                    <a:p>
+                      <a:pPr algn="ctr"/>
+                      <a:r>
+                        <a:rPr lang="en-GB" b="1" dirty="0"/>
+                        <a:t>Junit 5</a:t>
+                      </a:r>
+                    </a:p>
+                  </a:txBody>
+                  <a:tcPr/>
+                </a:tc>
+                <a:tc>
+                  <a:txBody>
+                    <a:bodyPr/>
+                    <a:lstStyle/>
+                    <a:p>
+                      <a:r>
+                        <a:rPr lang="en-GB" sz="1800" kern="1200" dirty="0">
+                          <a:solidFill>
+                            <a:schemeClr val="dk1"/>
+                          </a:solidFill>
+                          <a:effectLst/>
+                          <a:latin typeface="+mn-lt"/>
+                          <a:ea typeface="+mn-ea"/>
+                          <a:cs typeface="+mn-cs"/>
+                        </a:rPr>
+                        <a:t>Unit will be used as our testing framework</a:t>
+                      </a:r>
+                      <a:endParaRPr lang="en-GB" dirty="0"/>
+                    </a:p>
+                  </a:txBody>
+                  <a:tcPr/>
+                </a:tc>
+                <a:extLst>
+                  <a:ext uri="{0D108BD9-81ED-4DB2-BD59-A6C34878D82A}">
+                    <a16:rowId xmlns:a16="http://schemas.microsoft.com/office/drawing/2014/main" val="4268588682"/>
+                  </a:ext>
+                </a:extLst>
+              </a:tr>
+              <a:tr h="370840">
+                <a:tc>
+                  <a:txBody>
+                    <a:bodyPr/>
+                    <a:lstStyle/>
+                    <a:p>
+                      <a:pPr algn="ctr"/>
+                      <a:r>
+                        <a:rPr lang="en-GB" b="1" dirty="0"/>
+                        <a:t>Docker</a:t>
+                      </a:r>
+                    </a:p>
+                  </a:txBody>
+                  <a:tcPr/>
+                </a:tc>
+                <a:tc>
+                  <a:txBody>
+                    <a:bodyPr/>
+                    <a:lstStyle/>
+                    <a:p>
+                      <a:r>
+                        <a:rPr lang="en-GB" sz="1800" kern="1200" dirty="0">
+                          <a:solidFill>
+                            <a:schemeClr val="dk1"/>
+                          </a:solidFill>
+                          <a:effectLst/>
+                          <a:latin typeface="+mn-lt"/>
+                          <a:ea typeface="+mn-ea"/>
+                          <a:cs typeface="+mn-cs"/>
+                        </a:rPr>
+                        <a:t>Consistent isolated environment for development testing and deployment it will also works well with our CI/CD choice </a:t>
+                      </a:r>
+                      <a:endParaRPr lang="en-GB" dirty="0"/>
+                    </a:p>
+                  </a:txBody>
+                  <a:tcPr/>
+                </a:tc>
+                <a:extLst>
+                  <a:ext uri="{0D108BD9-81ED-4DB2-BD59-A6C34878D82A}">
+                    <a16:rowId xmlns:a16="http://schemas.microsoft.com/office/drawing/2014/main" val="2088855550"/>
+                  </a:ext>
+                </a:extLst>
+              </a:tr>
+              <a:tr h="370840">
+                <a:tc>
+                  <a:txBody>
+                    <a:bodyPr/>
+                    <a:lstStyle/>
+                    <a:p>
+                      <a:pPr algn="ctr"/>
+                      <a:r>
+                        <a:rPr lang="en-GB" sz="1800" b="1" kern="1200" dirty="0">
+                          <a:solidFill>
+                            <a:schemeClr val="lt1"/>
+                          </a:solidFill>
+                          <a:effectLst/>
+                          <a:latin typeface="+mn-lt"/>
+                          <a:ea typeface="+mn-ea"/>
+                          <a:cs typeface="+mn-cs"/>
+                        </a:rPr>
+                        <a:t>Spring Boot </a:t>
+                      </a:r>
+                      <a:endParaRPr lang="en-GB" b="1" dirty="0"/>
+                    </a:p>
+                  </a:txBody>
+                  <a:tcPr/>
+                </a:tc>
+                <a:tc>
+                  <a:txBody>
+                    <a:bodyPr/>
+                    <a:lstStyle/>
+                    <a:p>
+                      <a:r>
+                        <a:rPr lang="en-GB" dirty="0"/>
+                        <a:t>Framework will be used to develop our application, well documents and mature framework</a:t>
+                      </a:r>
+                    </a:p>
+                  </a:txBody>
+                  <a:tcPr/>
+                </a:tc>
+                <a:extLst>
+                  <a:ext uri="{0D108BD9-81ED-4DB2-BD59-A6C34878D82A}">
+                    <a16:rowId xmlns:a16="http://schemas.microsoft.com/office/drawing/2014/main" val="1407414577"/>
+                  </a:ext>
+                </a:extLst>
+              </a:tr>
+              <a:tr h="370840">
+                <a:tc>
+                  <a:txBody>
+                    <a:bodyPr/>
+                    <a:lstStyle/>
+                    <a:p>
+                      <a:pPr algn="ctr"/>
+                      <a:r>
+                        <a:rPr lang="en-GB" sz="1800" b="1" kern="1200" dirty="0">
+                          <a:solidFill>
+                            <a:schemeClr val="lt1"/>
+                          </a:solidFill>
+                          <a:effectLst/>
+                          <a:latin typeface="+mn-lt"/>
+                          <a:ea typeface="+mn-ea"/>
+                          <a:cs typeface="+mn-cs"/>
+                        </a:rPr>
+                        <a:t>Tomcat 7</a:t>
+                      </a:r>
+                      <a:endParaRPr lang="en-GB" b="1" dirty="0"/>
+                    </a:p>
+                  </a:txBody>
+                  <a:tcPr/>
+                </a:tc>
+                <a:tc>
+                  <a:txBody>
+                    <a:bodyPr/>
+                    <a:lstStyle/>
+                    <a:p>
+                      <a:r>
+                        <a:rPr lang="en-GB" dirty="0"/>
+                        <a:t>The default webserver for Spring Boot, </a:t>
+                      </a:r>
+                    </a:p>
+                  </a:txBody>
+                  <a:tcPr/>
+                </a:tc>
+                <a:extLst>
+                  <a:ext uri="{0D108BD9-81ED-4DB2-BD59-A6C34878D82A}">
+                    <a16:rowId xmlns:a16="http://schemas.microsoft.com/office/drawing/2014/main" val="2848047174"/>
+                  </a:ext>
+                </a:extLst>
+              </a:tr>
+              <a:tr h="370840">
+                <a:tc>
+                  <a:txBody>
+                    <a:bodyPr/>
+                    <a:lstStyle/>
+                    <a:p>
+                      <a:pPr algn="ctr"/>
+                      <a:r>
+                        <a:rPr lang="en-GB" b="1" dirty="0"/>
+                        <a:t>JSP</a:t>
+                      </a:r>
+                    </a:p>
+                  </a:txBody>
+                  <a:tcPr/>
+                </a:tc>
+                <a:tc>
+                  <a:txBody>
+                    <a:bodyPr/>
+                    <a:lstStyle/>
+                    <a:p>
+                      <a:r>
+                        <a:rPr lang="en-GB" sz="1800" kern="1200" dirty="0">
+                          <a:solidFill>
+                            <a:schemeClr val="dk1"/>
+                          </a:solidFill>
+                          <a:effectLst/>
+                          <a:latin typeface="+mn-lt"/>
+                          <a:ea typeface="+mn-ea"/>
+                          <a:cs typeface="+mn-cs"/>
+                        </a:rPr>
+                        <a:t>Allowing for rapid development and is also platform and server independent </a:t>
+                      </a:r>
+                      <a:endParaRPr lang="en-GB" dirty="0"/>
+                    </a:p>
+                  </a:txBody>
+                  <a:tcPr/>
+                </a:tc>
+                <a:extLst>
+                  <a:ext uri="{0D108BD9-81ED-4DB2-BD59-A6C34878D82A}">
+                    <a16:rowId xmlns:a16="http://schemas.microsoft.com/office/drawing/2014/main" val="15248599"/>
+                  </a:ext>
+                </a:extLst>
+              </a:tr>
+            </a:tbl>
+          </a:graphicData>
+        </a:graphic>
+      </p:graphicFrame>
+      <p:sp>
+        <p:nvSpPr>
+          <p:cNvPr id="8" name="Right Brace 7">
+            <a:extLst>
+              <a:ext uri="{FF2B5EF4-FFF2-40B4-BE49-F238E27FC236}">
+                <a16:creationId xmlns:a16="http://schemas.microsoft.com/office/drawing/2014/main" id="{617E716E-BEA6-431F-9CAC-5A1EDAD9A8EA}"/>
+              </a:ext>
+            </a:extLst>
+          </p:cNvPr>
+          <p:cNvSpPr/>
+          <p:nvPr/>
+        </p:nvSpPr>
+        <p:spPr>
+          <a:xfrm>
+            <a:off x="8663473" y="2076061"/>
+            <a:ext cx="45719" cy="45719"/>
+          </a:xfrm>
+          <a:prstGeom prst="rightBrace">
+            <a:avLst/>
+          </a:prstGeom>
+        </p:spPr>
+        <p:style>
+          <a:lnRef idx="1">
+            <a:schemeClr val="accent1"/>
+          </a:lnRef>
+          <a:fillRef idx="0">
+            <a:schemeClr val="accent1"/>
+          </a:fillRef>
+          <a:effectRef idx="0">
+            <a:schemeClr val="accent1"/>
+          </a:effectRef>
+          <a:fontRef idx="minor">
+            <a:schemeClr val="tx1"/>
+          </a:fontRef>
+        </p:style>
+        <p:txBody>
+          <a:bodyPr rtlCol="0" anchor="ctr"/>
           <a:lstStyle/>
           <a:p>
-            <a:endParaRPr lang="en-US"/>
+            <a:pPr algn="ctr"/>
+            <a:endParaRPr lang="en-GB"/>
           </a:p>
         </p:txBody>
       </p:sp>
@@ -7100,7 +7890,7 @@
           <a:bodyPr/>
           <a:lstStyle/>
           <a:p>
-            <a:endParaRPr lang="en-US"/>
+            <a:endParaRPr lang="en-US" dirty="0"/>
           </a:p>
         </p:txBody>
       </p:sp>
@@ -8101,4 +8891,299 @@
     </a:ext>
   </a:extLst>
 </a:theme>
+</file>
+
+<file path=ppt/theme/theme2.xml><?xml version="1.0" encoding="utf-8"?>
+<a:theme xmlns:a="http://schemas.openxmlformats.org/drawingml/2006/main" name="Office Theme">
+  <a:themeElements>
+    <a:clrScheme name="Office">
+      <a:dk1>
+        <a:sysClr val="windowText" lastClr="000000"/>
+      </a:dk1>
+      <a:lt1>
+        <a:sysClr val="window" lastClr="FFFFFF"/>
+      </a:lt1>
+      <a:dk2>
+        <a:srgbClr val="44546A"/>
+      </a:dk2>
+      <a:lt2>
+        <a:srgbClr val="E7E6E6"/>
+      </a:lt2>
+      <a:accent1>
+        <a:srgbClr val="4472C4"/>
+      </a:accent1>
+      <a:accent2>
+        <a:srgbClr val="ED7D31"/>
+      </a:accent2>
+      <a:accent3>
+        <a:srgbClr val="A5A5A5"/>
+      </a:accent3>
+      <a:accent4>
+        <a:srgbClr val="FFC000"/>
+      </a:accent4>
+      <a:accent5>
+        <a:srgbClr val="5B9BD5"/>
+      </a:accent5>
+      <a:accent6>
+        <a:srgbClr val="70AD47"/>
+      </a:accent6>
+      <a:hlink>
+        <a:srgbClr val="0563C1"/>
+      </a:hlink>
+      <a:folHlink>
+        <a:srgbClr val="954F72"/>
+      </a:folHlink>
+    </a:clrScheme>
+    <a:fontScheme name="Office">
+      <a:majorFont>
+        <a:latin typeface="Calibri Light" panose="020F0302020204030204"/>
+        <a:ea typeface=""/>
+        <a:cs typeface=""/>
+        <a:font script="Jpan" typeface="游ゴシック Light"/>
+        <a:font script="Hang" typeface="맑은 고딕"/>
+        <a:font script="Hans" typeface="等线 Light"/>
+        <a:font script="Hant" typeface="新細明體"/>
+        <a:font script="Arab" typeface="Times New Roman"/>
+        <a:font script="Hebr" typeface="Times New Roman"/>
+        <a:font script="Thai" typeface="Angsana New"/>
+        <a:font script="Ethi" typeface="Nyala"/>
+        <a:font script="Beng" typeface="Vrinda"/>
+        <a:font script="Gujr" typeface="Shruti"/>
+        <a:font script="Khmr" typeface="MoolBoran"/>
+        <a:font script="Knda" typeface="Tunga"/>
+        <a:font script="Guru" typeface="Raavi"/>
+        <a:font script="Cans" typeface="Euphemia"/>
+        <a:font script="Cher" typeface="Plantagenet Cherokee"/>
+        <a:font script="Yiii" typeface="Microsoft Yi Baiti"/>
+        <a:font script="Tibt" typeface="Microsoft Himalaya"/>
+        <a:font script="Thaa" typeface="MV Boli"/>
+        <a:font script="Deva" typeface="Mangal"/>
+        <a:font script="Telu" typeface="Gautami"/>
+        <a:font script="Taml" typeface="Latha"/>
+        <a:font script="Syrc" typeface="Estrangelo Edessa"/>
+        <a:font script="Orya" typeface="Kalinga"/>
+        <a:font script="Mlym" typeface="Kartika"/>
+        <a:font script="Laoo" typeface="DokChampa"/>
+        <a:font script="Sinh" typeface="Iskoola Pota"/>
+        <a:font script="Mong" typeface="Mongolian Baiti"/>
+        <a:font script="Viet" typeface="Times New Roman"/>
+        <a:font script="Uigh" typeface="Microsoft Uighur"/>
+        <a:font script="Geor" typeface="Sylfaen"/>
+        <a:font script="Armn" typeface="Arial"/>
+        <a:font script="Bugi" typeface="Leelawadee UI"/>
+        <a:font script="Bopo" typeface="Microsoft JhengHei"/>
+        <a:font script="Java" typeface="Javanese Text"/>
+        <a:font script="Lisu" typeface="Segoe UI"/>
+        <a:font script="Mymr" typeface="Myanmar Text"/>
+        <a:font script="Nkoo" typeface="Ebrima"/>
+        <a:font script="Olck" typeface="Nirmala UI"/>
+        <a:font script="Osma" typeface="Ebrima"/>
+        <a:font script="Phag" typeface="Phagspa"/>
+        <a:font script="Syrn" typeface="Estrangelo Edessa"/>
+        <a:font script="Syrj" typeface="Estrangelo Edessa"/>
+        <a:font script="Syre" typeface="Estrangelo Edessa"/>
+        <a:font script="Sora" typeface="Nirmala UI"/>
+        <a:font script="Tale" typeface="Microsoft Tai Le"/>
+        <a:font script="Talu" typeface="Microsoft New Tai Lue"/>
+        <a:font script="Tfng" typeface="Ebrima"/>
+      </a:majorFont>
+      <a:minorFont>
+        <a:latin typeface="Calibri" panose="020F0502020204030204"/>
+        <a:ea typeface=""/>
+        <a:cs typeface=""/>
+        <a:font script="Jpan" typeface="游ゴシック"/>
+        <a:font script="Hang" typeface="맑은 고딕"/>
+        <a:font script="Hans" typeface="等线"/>
+        <a:font script="Hant" typeface="新細明體"/>
+        <a:font script="Arab" typeface="Arial"/>
+        <a:font script="Hebr" typeface="Arial"/>
+        <a:font script="Thai" typeface="Cordia New"/>
+        <a:font script="Ethi" typeface="Nyala"/>
+        <a:font script="Beng" typeface="Vrinda"/>
+        <a:font script="Gujr" typeface="Shruti"/>
+        <a:font script="Khmr" typeface="DaunPenh"/>
+        <a:font script="Knda" typeface="Tunga"/>
+        <a:font script="Guru" typeface="Raavi"/>
+        <a:font script="Cans" typeface="Euphemia"/>
+        <a:font script="Cher" typeface="Plantagenet Cherokee"/>
+        <a:font script="Yiii" typeface="Microsoft Yi Baiti"/>
+        <a:font script="Tibt" typeface="Microsoft Himalaya"/>
+        <a:font script="Thaa" typeface="MV Boli"/>
+        <a:font script="Deva" typeface="Mangal"/>
+        <a:font script="Telu" typeface="Gautami"/>
+        <a:font script="Taml" typeface="Latha"/>
+        <a:font script="Syrc" typeface="Estrangelo Edessa"/>
+        <a:font script="Orya" typeface="Kalinga"/>
+        <a:font script="Mlym" typeface="Kartika"/>
+        <a:font script="Laoo" typeface="DokChampa"/>
+        <a:font script="Sinh" typeface="Iskoola Pota"/>
+        <a:font script="Mong" typeface="Mongolian Baiti"/>
+        <a:font script="Viet" typeface="Arial"/>
+        <a:font script="Uigh" typeface="Microsoft Uighur"/>
+        <a:font script="Geor" typeface="Sylfaen"/>
+        <a:font script="Armn" typeface="Arial"/>
+        <a:font script="Bugi" typeface="Leelawadee UI"/>
+        <a:font script="Bopo" typeface="Microsoft JhengHei"/>
+        <a:font script="Java" typeface="Javanese Text"/>
+        <a:font script="Lisu" typeface="Segoe UI"/>
+        <a:font script="Mymr" typeface="Myanmar Text"/>
+        <a:font script="Nkoo" typeface="Ebrima"/>
+        <a:font script="Olck" typeface="Nirmala UI"/>
+        <a:font script="Osma" typeface="Ebrima"/>
+        <a:font script="Phag" typeface="Phagspa"/>
+        <a:font script="Syrn" typeface="Estrangelo Edessa"/>
+        <a:font script="Syrj" typeface="Estrangelo Edessa"/>
+        <a:font script="Syre" typeface="Estrangelo Edessa"/>
+        <a:font script="Sora" typeface="Nirmala UI"/>
+        <a:font script="Tale" typeface="Microsoft Tai Le"/>
+        <a:font script="Talu" typeface="Microsoft New Tai Lue"/>
+        <a:font script="Tfng" typeface="Ebrima"/>
+      </a:minorFont>
+    </a:fontScheme>
+    <a:fmtScheme name="Office">
+      <a:fillStyleLst>
+        <a:solidFill>
+          <a:schemeClr val="phClr"/>
+        </a:solidFill>
+        <a:gradFill rotWithShape="1">
+          <a:gsLst>
+            <a:gs pos="0">
+              <a:schemeClr val="phClr">
+                <a:lumMod val="110000"/>
+                <a:satMod val="105000"/>
+                <a:tint val="67000"/>
+              </a:schemeClr>
+            </a:gs>
+            <a:gs pos="50000">
+              <a:schemeClr val="phClr">
+                <a:lumMod val="105000"/>
+                <a:satMod val="103000"/>
+                <a:tint val="73000"/>
+              </a:schemeClr>
+            </a:gs>
+            <a:gs pos="100000">
+              <a:schemeClr val="phClr">
+                <a:lumMod val="105000"/>
+                <a:satMod val="109000"/>
+                <a:tint val="81000"/>
+              </a:schemeClr>
+            </a:gs>
+          </a:gsLst>
+          <a:lin ang="5400000" scaled="0"/>
+        </a:gradFill>
+        <a:gradFill rotWithShape="1">
+          <a:gsLst>
+            <a:gs pos="0">
+              <a:schemeClr val="phClr">
+                <a:satMod val="103000"/>
+                <a:lumMod val="102000"/>
+                <a:tint val="94000"/>
+              </a:schemeClr>
+            </a:gs>
+            <a:gs pos="50000">
+              <a:schemeClr val="phClr">
+                <a:satMod val="110000"/>
+                <a:lumMod val="100000"/>
+                <a:shade val="100000"/>
+              </a:schemeClr>
+            </a:gs>
+            <a:gs pos="100000">
+              <a:schemeClr val="phClr">
+                <a:lumMod val="99000"/>
+                <a:satMod val="120000"/>
+                <a:shade val="78000"/>
+              </a:schemeClr>
+            </a:gs>
+          </a:gsLst>
+          <a:lin ang="5400000" scaled="0"/>
+        </a:gradFill>
+      </a:fillStyleLst>
+      <a:lnStyleLst>
+        <a:ln w="6350" cap="flat" cmpd="sng" algn="ctr">
+          <a:solidFill>
+            <a:schemeClr val="phClr"/>
+          </a:solidFill>
+          <a:prstDash val="solid"/>
+          <a:miter lim="800000"/>
+        </a:ln>
+        <a:ln w="12700" cap="flat" cmpd="sng" algn="ctr">
+          <a:solidFill>
+            <a:schemeClr val="phClr"/>
+          </a:solidFill>
+          <a:prstDash val="solid"/>
+          <a:miter lim="800000"/>
+        </a:ln>
+        <a:ln w="19050" cap="flat" cmpd="sng" algn="ctr">
+          <a:solidFill>
+            <a:schemeClr val="phClr"/>
+          </a:solidFill>
+          <a:prstDash val="solid"/>
+          <a:miter lim="800000"/>
+        </a:ln>
+      </a:lnStyleLst>
+      <a:effectStyleLst>
+        <a:effectStyle>
+          <a:effectLst/>
+        </a:effectStyle>
+        <a:effectStyle>
+          <a:effectLst/>
+        </a:effectStyle>
+        <a:effectStyle>
+          <a:effectLst>
+            <a:outerShdw blurRad="57150" dist="19050" dir="5400000" algn="ctr" rotWithShape="0">
+              <a:srgbClr val="000000">
+                <a:alpha val="63000"/>
+              </a:srgbClr>
+            </a:outerShdw>
+          </a:effectLst>
+        </a:effectStyle>
+      </a:effectStyleLst>
+      <a:bgFillStyleLst>
+        <a:solidFill>
+          <a:schemeClr val="phClr"/>
+        </a:solidFill>
+        <a:solidFill>
+          <a:schemeClr val="phClr">
+            <a:tint val="95000"/>
+            <a:satMod val="170000"/>
+          </a:schemeClr>
+        </a:solidFill>
+        <a:gradFill rotWithShape="1">
+          <a:gsLst>
+            <a:gs pos="0">
+              <a:schemeClr val="phClr">
+                <a:tint val="93000"/>
+                <a:satMod val="150000"/>
+                <a:shade val="98000"/>
+                <a:lumMod val="102000"/>
+              </a:schemeClr>
+            </a:gs>
+            <a:gs pos="50000">
+              <a:schemeClr val="phClr">
+                <a:tint val="98000"/>
+                <a:satMod val="130000"/>
+                <a:shade val="90000"/>
+                <a:lumMod val="103000"/>
+              </a:schemeClr>
+            </a:gs>
+            <a:gs pos="100000">
+              <a:schemeClr val="phClr">
+                <a:shade val="63000"/>
+                <a:satMod val="120000"/>
+              </a:schemeClr>
+            </a:gs>
+          </a:gsLst>
+          <a:lin ang="5400000" scaled="0"/>
+        </a:gradFill>
+      </a:bgFillStyleLst>
+    </a:fmtScheme>
+  </a:themeElements>
+  <a:objectDefaults/>
+  <a:extraClrSchemeLst/>
+  <a:extLst>
+    <a:ext uri="{05A4C25C-085E-4340-85A3-A5531E510DB2}">
+      <thm15:themeFamily xmlns:thm15="http://schemas.microsoft.com/office/thememl/2012/main" name="Office Theme" id="{62F939B6-93AF-4DB8-9C6B-D6C7DFDC589F}" vid="{4A3C46E8-61CC-4603-A589-7422A47A8E4A}"/>
+    </a:ext>
+  </a:extLst>
+</a:theme>
 </file>
</xml_diff>

<commit_message>
Added swager to the technology evaluation
</commit_message>
<xml_diff>
--- a/documentation/Sprint2_PAA.pptx
+++ b/documentation/Sprint2_PAA.pptx
@@ -5,15 +5,16 @@
     <p:sldMasterId id="2147483738" r:id="rId1"/>
   </p:sldMasterIdLst>
   <p:notesMasterIdLst>
-    <p:notesMasterId r:id="rId8"/>
+    <p:notesMasterId r:id="rId9"/>
   </p:notesMasterIdLst>
   <p:sldIdLst>
     <p:sldId id="256" r:id="rId2"/>
     <p:sldId id="265" r:id="rId3"/>
     <p:sldId id="263" r:id="rId4"/>
     <p:sldId id="261" r:id="rId5"/>
-    <p:sldId id="264" r:id="rId6"/>
-    <p:sldId id="262" r:id="rId7"/>
+    <p:sldId id="266" r:id="rId6"/>
+    <p:sldId id="264" r:id="rId7"/>
+    <p:sldId id="262" r:id="rId8"/>
   </p:sldIdLst>
   <p:sldSz cx="12192000" cy="6858000"/>
   <p:notesSz cx="6858000" cy="9144000"/>
@@ -2909,7 +2910,7 @@
           <a:p>
             <a:fld id="{5D219B12-85DE-474F-82A6-F2BBEFB2572A}" type="datetimeFigureOut">
               <a:rPr lang="en-GB" smtClean="0"/>
-              <a:t>25/10/2021</a:t>
+              <a:t>26/10/2021</a:t>
             </a:fld>
             <a:endParaRPr lang="en-GB"/>
           </a:p>
@@ -3261,6 +3262,90 @@
 </p:notes>
 </file>
 
+<file path=ppt/notesSlides/notesSlide2.xml><?xml version="1.0" encoding="utf-8"?>
+<p:notes xmlns:a="http://schemas.openxmlformats.org/drawingml/2006/main" xmlns:r="http://schemas.openxmlformats.org/officeDocument/2006/relationships" xmlns:p="http://schemas.openxmlformats.org/presentationml/2006/main">
+  <p:cSld>
+    <p:spTree>
+      <p:nvGrpSpPr>
+        <p:cNvPr id="1" name=""/>
+        <p:cNvGrpSpPr/>
+        <p:nvPr/>
+      </p:nvGrpSpPr>
+      <p:grpSpPr>
+        <a:xfrm>
+          <a:off x="0" y="0"/>
+          <a:ext cx="0" cy="0"/>
+          <a:chOff x="0" y="0"/>
+          <a:chExt cx="0" cy="0"/>
+        </a:xfrm>
+      </p:grpSpPr>
+      <p:sp>
+        <p:nvSpPr>
+          <p:cNvPr id="2" name="Slide Image Placeholder 1"/>
+          <p:cNvSpPr>
+            <a:spLocks noGrp="1" noRot="1" noChangeAspect="1"/>
+          </p:cNvSpPr>
+          <p:nvPr>
+            <p:ph type="sldImg"/>
+          </p:nvPr>
+        </p:nvSpPr>
+        <p:spPr/>
+      </p:sp>
+      <p:sp>
+        <p:nvSpPr>
+          <p:cNvPr id="3" name="Notes Placeholder 2"/>
+          <p:cNvSpPr>
+            <a:spLocks noGrp="1"/>
+          </p:cNvSpPr>
+          <p:nvPr>
+            <p:ph type="body" idx="1"/>
+          </p:nvPr>
+        </p:nvSpPr>
+        <p:spPr/>
+        <p:txBody>
+          <a:bodyPr/>
+          <a:lstStyle/>
+          <a:p>
+            <a:endParaRPr lang="en-GB" dirty="0"/>
+          </a:p>
+        </p:txBody>
+      </p:sp>
+      <p:sp>
+        <p:nvSpPr>
+          <p:cNvPr id="4" name="Slide Number Placeholder 3"/>
+          <p:cNvSpPr>
+            <a:spLocks noGrp="1"/>
+          </p:cNvSpPr>
+          <p:nvPr>
+            <p:ph type="sldNum" sz="quarter" idx="5"/>
+          </p:nvPr>
+        </p:nvSpPr>
+        <p:spPr/>
+        <p:txBody>
+          <a:bodyPr/>
+          <a:lstStyle/>
+          <a:p>
+            <a:fld id="{E7F9E5FC-C6E5-41A9-8D74-144FA0CB37AF}" type="slidenum">
+              <a:rPr lang="en-GB" smtClean="0"/>
+              <a:t>5</a:t>
+            </a:fld>
+            <a:endParaRPr lang="en-GB"/>
+          </a:p>
+        </p:txBody>
+      </p:sp>
+    </p:spTree>
+    <p:extLst>
+      <p:ext uri="{BB962C8B-B14F-4D97-AF65-F5344CB8AC3E}">
+        <p14:creationId xmlns:p14="http://schemas.microsoft.com/office/powerpoint/2010/main" val="690620648"/>
+      </p:ext>
+    </p:extLst>
+  </p:cSld>
+  <p:clrMapOvr>
+    <a:masterClrMapping/>
+  </p:clrMapOvr>
+</p:notes>
+</file>
+
 <file path=ppt/slideLayouts/slideLayout1.xml><?xml version="1.0" encoding="utf-8"?>
 <p:sldLayout xmlns:a="http://schemas.openxmlformats.org/drawingml/2006/main" xmlns:r="http://schemas.openxmlformats.org/officeDocument/2006/relationships" xmlns:p="http://schemas.openxmlformats.org/presentationml/2006/main" type="title" preserve="1">
   <p:cSld name="Title Slide">
@@ -3412,7 +3497,7 @@
           <a:p>
             <a:fld id="{8C28A28C-4C6A-46EA-90C0-4EE0B89CC5C7}" type="datetimeFigureOut">
               <a:rPr lang="en-US" smtClean="0"/>
-              <a:t>10/25/2021</a:t>
+              <a:t>10/26/2021</a:t>
             </a:fld>
             <a:endParaRPr lang="en-US" dirty="0"/>
           </a:p>
@@ -3610,7 +3695,7 @@
           <a:p>
             <a:fld id="{8C28A28C-4C6A-46EA-90C0-4EE0B89CC5C7}" type="datetimeFigureOut">
               <a:rPr lang="en-US" smtClean="0"/>
-              <a:t>10/25/2021</a:t>
+              <a:t>10/26/2021</a:t>
             </a:fld>
             <a:endParaRPr lang="en-US"/>
           </a:p>
@@ -3818,7 +3903,7 @@
           <a:p>
             <a:fld id="{8C28A28C-4C6A-46EA-90C0-4EE0B89CC5C7}" type="datetimeFigureOut">
               <a:rPr lang="en-US" smtClean="0"/>
-              <a:t>10/25/2021</a:t>
+              <a:t>10/26/2021</a:t>
             </a:fld>
             <a:endParaRPr lang="en-US"/>
           </a:p>
@@ -4016,7 +4101,7 @@
           <a:p>
             <a:fld id="{8C28A28C-4C6A-46EA-90C0-4EE0B89CC5C7}" type="datetimeFigureOut">
               <a:rPr lang="en-US" smtClean="0"/>
-              <a:t>10/25/2021</a:t>
+              <a:t>10/26/2021</a:t>
             </a:fld>
             <a:endParaRPr lang="en-US"/>
           </a:p>
@@ -4293,7 +4378,7 @@
           <a:p>
             <a:fld id="{8C28A28C-4C6A-46EA-90C0-4EE0B89CC5C7}" type="datetimeFigureOut">
               <a:rPr lang="en-US" smtClean="0"/>
-              <a:t>10/25/2021</a:t>
+              <a:t>10/26/2021</a:t>
             </a:fld>
             <a:endParaRPr lang="en-US"/>
           </a:p>
@@ -4558,7 +4643,7 @@
           <a:p>
             <a:fld id="{8C28A28C-4C6A-46EA-90C0-4EE0B89CC5C7}" type="datetimeFigureOut">
               <a:rPr lang="en-US" smtClean="0"/>
-              <a:t>10/25/2021</a:t>
+              <a:t>10/26/2021</a:t>
             </a:fld>
             <a:endParaRPr lang="en-US"/>
           </a:p>
@@ -4970,7 +5055,7 @@
           <a:p>
             <a:fld id="{8C28A28C-4C6A-46EA-90C0-4EE0B89CC5C7}" type="datetimeFigureOut">
               <a:rPr lang="en-US" smtClean="0"/>
-              <a:t>10/25/2021</a:t>
+              <a:t>10/26/2021</a:t>
             </a:fld>
             <a:endParaRPr lang="en-US"/>
           </a:p>
@@ -5111,7 +5196,7 @@
           <a:p>
             <a:fld id="{8C28A28C-4C6A-46EA-90C0-4EE0B89CC5C7}" type="datetimeFigureOut">
               <a:rPr lang="en-US" smtClean="0"/>
-              <a:t>10/25/2021</a:t>
+              <a:t>10/26/2021</a:t>
             </a:fld>
             <a:endParaRPr lang="en-US"/>
           </a:p>
@@ -5224,7 +5309,7 @@
           <a:p>
             <a:fld id="{8C28A28C-4C6A-46EA-90C0-4EE0B89CC5C7}" type="datetimeFigureOut">
               <a:rPr lang="en-US" smtClean="0"/>
-              <a:t>10/25/2021</a:t>
+              <a:t>10/26/2021</a:t>
             </a:fld>
             <a:endParaRPr lang="en-US"/>
           </a:p>
@@ -5537,7 +5622,7 @@
           <a:p>
             <a:fld id="{8C28A28C-4C6A-46EA-90C0-4EE0B89CC5C7}" type="datetimeFigureOut">
               <a:rPr lang="en-US" smtClean="0"/>
-              <a:t>10/25/2021</a:t>
+              <a:t>10/26/2021</a:t>
             </a:fld>
             <a:endParaRPr lang="en-US"/>
           </a:p>
@@ -5825,7 +5910,7 @@
           <a:p>
             <a:fld id="{8C28A28C-4C6A-46EA-90C0-4EE0B89CC5C7}" type="datetimeFigureOut">
               <a:rPr lang="en-US" smtClean="0"/>
-              <a:t>10/25/2021</a:t>
+              <a:t>10/26/2021</a:t>
             </a:fld>
             <a:endParaRPr lang="en-US"/>
           </a:p>
@@ -6180,7 +6265,7 @@
             <a:fld id="{8C28A28C-4C6A-46EA-90C0-4EE0B89CC5C7}" type="datetimeFigureOut">
               <a:rPr lang="en-US" smtClean="0"/>
               <a:pPr/>
-              <a:t>10/25/2021</a:t>
+              <a:t>10/26/2021</a:t>
             </a:fld>
             <a:endParaRPr lang="en-US" dirty="0"/>
           </a:p>
@@ -7449,14 +7534,14 @@
             <p:ph idx="1"/>
             <p:extLst>
               <p:ext uri="{D42A27DB-BD31-4B8C-83A1-F6EECF244321}">
-                <p14:modId xmlns:p14="http://schemas.microsoft.com/office/powerpoint/2010/main" val="4248744399"/>
+                <p14:modId xmlns:p14="http://schemas.microsoft.com/office/powerpoint/2010/main" val="1446209424"/>
               </p:ext>
             </p:extLst>
           </p:nvPr>
         </p:nvGraphicFramePr>
         <p:xfrm>
           <a:off x="1077913" y="2427288"/>
-          <a:ext cx="9778254" cy="3672840"/>
+          <a:ext cx="9778254" cy="2021840"/>
         </p:xfrm>
         <a:graphic>
           <a:graphicData uri="http://schemas.openxmlformats.org/drawingml/2006/table">
@@ -7634,6 +7719,159 @@
                   </a:ext>
                 </a:extLst>
               </a:tr>
+            </a:tbl>
+          </a:graphicData>
+        </a:graphic>
+      </p:graphicFrame>
+      <p:sp>
+        <p:nvSpPr>
+          <p:cNvPr id="8" name="Right Brace 7">
+            <a:extLst>
+              <a:ext uri="{FF2B5EF4-FFF2-40B4-BE49-F238E27FC236}">
+                <a16:creationId xmlns:a16="http://schemas.microsoft.com/office/drawing/2014/main" id="{617E716E-BEA6-431F-9CAC-5A1EDAD9A8EA}"/>
+              </a:ext>
+            </a:extLst>
+          </p:cNvPr>
+          <p:cNvSpPr/>
+          <p:nvPr/>
+        </p:nvSpPr>
+        <p:spPr>
+          <a:xfrm>
+            <a:off x="8663473" y="2076061"/>
+            <a:ext cx="45719" cy="45719"/>
+          </a:xfrm>
+          <a:prstGeom prst="rightBrace">
+            <a:avLst/>
+          </a:prstGeom>
+        </p:spPr>
+        <p:style>
+          <a:lnRef idx="1">
+            <a:schemeClr val="accent1"/>
+          </a:lnRef>
+          <a:fillRef idx="0">
+            <a:schemeClr val="accent1"/>
+          </a:fillRef>
+          <a:effectRef idx="0">
+            <a:schemeClr val="accent1"/>
+          </a:effectRef>
+          <a:fontRef idx="minor">
+            <a:schemeClr val="tx1"/>
+          </a:fontRef>
+        </p:style>
+        <p:txBody>
+          <a:bodyPr rtlCol="0" anchor="ctr"/>
+          <a:lstStyle/>
+          <a:p>
+            <a:pPr algn="ctr"/>
+            <a:endParaRPr lang="en-GB"/>
+          </a:p>
+        </p:txBody>
+      </p:sp>
+    </p:spTree>
+    <p:extLst>
+      <p:ext uri="{BB962C8B-B14F-4D97-AF65-F5344CB8AC3E}">
+        <p14:creationId xmlns:p14="http://schemas.microsoft.com/office/powerpoint/2010/main" val="2977457609"/>
+      </p:ext>
+    </p:extLst>
+  </p:cSld>
+  <p:clrMapOvr>
+    <a:masterClrMapping/>
+  </p:clrMapOvr>
+</p:sld>
+</file>
+
+<file path=ppt/slides/slide5.xml><?xml version="1.0" encoding="utf-8"?>
+<p:sld xmlns:a="http://schemas.openxmlformats.org/drawingml/2006/main" xmlns:r="http://schemas.openxmlformats.org/officeDocument/2006/relationships" xmlns:p="http://schemas.openxmlformats.org/presentationml/2006/main">
+  <p:cSld>
+    <p:spTree>
+      <p:nvGrpSpPr>
+        <p:cNvPr id="1" name=""/>
+        <p:cNvGrpSpPr/>
+        <p:nvPr/>
+      </p:nvGrpSpPr>
+      <p:grpSpPr>
+        <a:xfrm>
+          <a:off x="0" y="0"/>
+          <a:ext cx="0" cy="0"/>
+          <a:chOff x="0" y="0"/>
+          <a:chExt cx="0" cy="0"/>
+        </a:xfrm>
+      </p:grpSpPr>
+      <p:sp>
+        <p:nvSpPr>
+          <p:cNvPr id="2" name="Title 1">
+            <a:extLst>
+              <a:ext uri="{FF2B5EF4-FFF2-40B4-BE49-F238E27FC236}">
+                <a16:creationId xmlns:a16="http://schemas.microsoft.com/office/drawing/2014/main" id="{42E02457-1F6E-864B-BE92-1849C1385466}"/>
+              </a:ext>
+            </a:extLst>
+          </p:cNvPr>
+          <p:cNvSpPr>
+            <a:spLocks noGrp="1"/>
+          </p:cNvSpPr>
+          <p:nvPr>
+            <p:ph type="title"/>
+          </p:nvPr>
+        </p:nvSpPr>
+        <p:spPr/>
+        <p:txBody>
+          <a:bodyPr/>
+          <a:lstStyle/>
+          <a:p>
+            <a:r>
+              <a:rPr lang="en-US" dirty="0"/>
+              <a:t>Technology evaluation</a:t>
+            </a:r>
+          </a:p>
+        </p:txBody>
+      </p:sp>
+      <p:graphicFrame>
+        <p:nvGraphicFramePr>
+          <p:cNvPr id="11" name="Table 11">
+            <a:extLst>
+              <a:ext uri="{FF2B5EF4-FFF2-40B4-BE49-F238E27FC236}">
+                <a16:creationId xmlns:a16="http://schemas.microsoft.com/office/drawing/2014/main" id="{F41F6B7D-8501-4DED-9376-95D264F2C17E}"/>
+              </a:ext>
+            </a:extLst>
+          </p:cNvPr>
+          <p:cNvGraphicFramePr>
+            <a:graphicFrameLocks noGrp="1"/>
+          </p:cNvGraphicFramePr>
+          <p:nvPr>
+            <p:ph idx="1"/>
+            <p:extLst>
+              <p:ext uri="{D42A27DB-BD31-4B8C-83A1-F6EECF244321}">
+                <p14:modId xmlns:p14="http://schemas.microsoft.com/office/powerpoint/2010/main" val="3203511161"/>
+              </p:ext>
+            </p:extLst>
+          </p:nvPr>
+        </p:nvGraphicFramePr>
+        <p:xfrm>
+          <a:off x="1077913" y="2427288"/>
+          <a:ext cx="9778254" cy="2021840"/>
+        </p:xfrm>
+        <a:graphic>
+          <a:graphicData uri="http://schemas.openxmlformats.org/drawingml/2006/table">
+            <a:tbl>
+              <a:tblPr firstCol="1" bandRow="1">
+                <a:tableStyleId>{5C22544A-7EE6-4342-B048-85BDC9FD1C3A}</a:tableStyleId>
+              </a:tblPr>
+              <a:tblGrid>
+                <a:gridCol w="2728032">
+                  <a:extLst>
+                    <a:ext uri="{9D8B030D-6E8A-4147-A177-3AD203B41FA5}">
+                      <a16:colId xmlns:a16="http://schemas.microsoft.com/office/drawing/2014/main" val="2942096635"/>
+                    </a:ext>
+                  </a:extLst>
+                </a:gridCol>
+                <a:gridCol w="7050222">
+                  <a:extLst>
+                    <a:ext uri="{9D8B030D-6E8A-4147-A177-3AD203B41FA5}">
+                      <a16:colId xmlns:a16="http://schemas.microsoft.com/office/drawing/2014/main" val="2381315393"/>
+                    </a:ext>
+                  </a:extLst>
+                </a:gridCol>
+              </a:tblGrid>
               <a:tr h="370840">
                 <a:tc>
                   <a:txBody>
@@ -7673,7 +7911,7 @@
                 </a:tc>
                 <a:extLst>
                   <a:ext uri="{0D108BD9-81ED-4DB2-BD59-A6C34878D82A}">
-                    <a16:rowId xmlns:a16="http://schemas.microsoft.com/office/drawing/2014/main" val="1407414577"/>
+                    <a16:rowId xmlns:a16="http://schemas.microsoft.com/office/drawing/2014/main" val="4012133355"/>
                   </a:ext>
                 </a:extLst>
               </a:tr>
@@ -7716,7 +7954,7 @@
                 </a:tc>
                 <a:extLst>
                   <a:ext uri="{0D108BD9-81ED-4DB2-BD59-A6C34878D82A}">
-                    <a16:rowId xmlns:a16="http://schemas.microsoft.com/office/drawing/2014/main" val="2848047174"/>
+                    <a16:rowId xmlns:a16="http://schemas.microsoft.com/office/drawing/2014/main" val="481127041"/>
                   </a:ext>
                 </a:extLst>
               </a:tr>
@@ -7752,6 +7990,49 @@
                         </a:rPr>
                         <a:t>Allowing for rapid development and is also platform and server independent </a:t>
                       </a:r>
+                    </a:p>
+                  </a:txBody>
+                  <a:tcPr/>
+                </a:tc>
+                <a:extLst>
+                  <a:ext uri="{0D108BD9-81ED-4DB2-BD59-A6C34878D82A}">
+                    <a16:rowId xmlns:a16="http://schemas.microsoft.com/office/drawing/2014/main" val="4268588682"/>
+                  </a:ext>
+                </a:extLst>
+              </a:tr>
+              <a:tr h="370840">
+                <a:tc>
+                  <a:txBody>
+                    <a:bodyPr/>
+                    <a:lstStyle/>
+                    <a:p>
+                      <a:pPr algn="ctr"/>
+                      <a:r>
+                        <a:rPr lang="en-GB" sz="1800" b="1" kern="1200" dirty="0">
+                          <a:solidFill>
+                            <a:schemeClr val="lt1"/>
+                          </a:solidFill>
+                          <a:effectLst/>
+                          <a:latin typeface="+mn-lt"/>
+                          <a:ea typeface="+mn-ea"/>
+                          <a:cs typeface="+mn-cs"/>
+                        </a:rPr>
+                        <a:t>Swagger</a:t>
+                      </a:r>
+                      <a:endParaRPr lang="en-GB" b="1" dirty="0"/>
+                    </a:p>
+                  </a:txBody>
+                  <a:tcPr/>
+                </a:tc>
+                <a:tc>
+                  <a:txBody>
+                    <a:bodyPr/>
+                    <a:lstStyle/>
+                    <a:p>
+                      <a:r>
+                        <a:rPr lang="en-GB"/>
+                        <a:t>API documentation</a:t>
+                      </a:r>
                       <a:endParaRPr lang="en-GB" dirty="0"/>
                     </a:p>
                   </a:txBody>
@@ -7759,7 +8040,7 @@
                 </a:tc>
                 <a:extLst>
                   <a:ext uri="{0D108BD9-81ED-4DB2-BD59-A6C34878D82A}">
-                    <a16:rowId xmlns:a16="http://schemas.microsoft.com/office/drawing/2014/main" val="15248599"/>
+                    <a16:rowId xmlns:a16="http://schemas.microsoft.com/office/drawing/2014/main" val="2088855550"/>
                   </a:ext>
                 </a:extLst>
               </a:tr>
@@ -7814,7 +8095,7 @@
     </p:spTree>
     <p:extLst>
       <p:ext uri="{BB962C8B-B14F-4D97-AF65-F5344CB8AC3E}">
-        <p14:creationId xmlns:p14="http://schemas.microsoft.com/office/powerpoint/2010/main" val="2977457609"/>
+        <p14:creationId xmlns:p14="http://schemas.microsoft.com/office/powerpoint/2010/main" val="3094364620"/>
       </p:ext>
     </p:extLst>
   </p:cSld>
@@ -7824,7 +8105,7 @@
 </p:sld>
 </file>
 
-<file path=ppt/slides/slide5.xml><?xml version="1.0" encoding="utf-8"?>
+<file path=ppt/slides/slide6.xml><?xml version="1.0" encoding="utf-8"?>
 <p:sld xmlns:a="http://schemas.openxmlformats.org/drawingml/2006/main" xmlns:r="http://schemas.openxmlformats.org/officeDocument/2006/relationships" xmlns:p="http://schemas.openxmlformats.org/presentationml/2006/main">
   <p:cSld>
     <p:spTree>
@@ -7907,7 +8188,7 @@
 </p:sld>
 </file>
 
-<file path=ppt/slides/slide6.xml><?xml version="1.0" encoding="utf-8"?>
+<file path=ppt/slides/slide7.xml><?xml version="1.0" encoding="utf-8"?>
 <p:sld xmlns:a="http://schemas.openxmlformats.org/drawingml/2006/main" xmlns:r="http://schemas.openxmlformats.org/officeDocument/2006/relationships" xmlns:p="http://schemas.openxmlformats.org/presentationml/2006/main">
   <p:cSld>
     <p:bg>

</xml_diff>

<commit_message>
Improved the Sprint2 presentation
</commit_message>
<xml_diff>
--- a/documentation/Sprint2_PAA.pptx
+++ b/documentation/Sprint2_PAA.pptx
@@ -5,7 +5,7 @@
     <p:sldMasterId id="2147483738" r:id="rId1"/>
   </p:sldMasterIdLst>
   <p:notesMasterIdLst>
-    <p:notesMasterId r:id="rId9"/>
+    <p:notesMasterId r:id="rId11"/>
   </p:notesMasterIdLst>
   <p:sldIdLst>
     <p:sldId id="256" r:id="rId2"/>
@@ -14,7 +14,9 @@
     <p:sldId id="261" r:id="rId5"/>
     <p:sldId id="266" r:id="rId6"/>
     <p:sldId id="264" r:id="rId7"/>
-    <p:sldId id="262" r:id="rId8"/>
+    <p:sldId id="267" r:id="rId8"/>
+    <p:sldId id="268" r:id="rId9"/>
+    <p:sldId id="262" r:id="rId10"/>
   </p:sldIdLst>
   <p:sldSz cx="12192000" cy="6858000"/>
   <p:notesSz cx="6858000" cy="9144000"/>
@@ -2910,7 +2912,7 @@
           <a:p>
             <a:fld id="{5D219B12-85DE-474F-82A6-F2BBEFB2572A}" type="datetimeFigureOut">
               <a:rPr lang="en-GB" smtClean="0"/>
-              <a:t>26/10/2021</a:t>
+              <a:t>31/10/2021</a:t>
             </a:fld>
             <a:endParaRPr lang="en-GB"/>
           </a:p>
@@ -3497,7 +3499,7 @@
           <a:p>
             <a:fld id="{8C28A28C-4C6A-46EA-90C0-4EE0B89CC5C7}" type="datetimeFigureOut">
               <a:rPr lang="en-US" smtClean="0"/>
-              <a:t>10/26/2021</a:t>
+              <a:t>10/31/21</a:t>
             </a:fld>
             <a:endParaRPr lang="en-US" dirty="0"/>
           </a:p>
@@ -3695,7 +3697,7 @@
           <a:p>
             <a:fld id="{8C28A28C-4C6A-46EA-90C0-4EE0B89CC5C7}" type="datetimeFigureOut">
               <a:rPr lang="en-US" smtClean="0"/>
-              <a:t>10/26/2021</a:t>
+              <a:t>10/31/21</a:t>
             </a:fld>
             <a:endParaRPr lang="en-US"/>
           </a:p>
@@ -3903,7 +3905,7 @@
           <a:p>
             <a:fld id="{8C28A28C-4C6A-46EA-90C0-4EE0B89CC5C7}" type="datetimeFigureOut">
               <a:rPr lang="en-US" smtClean="0"/>
-              <a:t>10/26/2021</a:t>
+              <a:t>10/31/21</a:t>
             </a:fld>
             <a:endParaRPr lang="en-US"/>
           </a:p>
@@ -4101,7 +4103,7 @@
           <a:p>
             <a:fld id="{8C28A28C-4C6A-46EA-90C0-4EE0B89CC5C7}" type="datetimeFigureOut">
               <a:rPr lang="en-US" smtClean="0"/>
-              <a:t>10/26/2021</a:t>
+              <a:t>10/31/21</a:t>
             </a:fld>
             <a:endParaRPr lang="en-US"/>
           </a:p>
@@ -4378,7 +4380,7 @@
           <a:p>
             <a:fld id="{8C28A28C-4C6A-46EA-90C0-4EE0B89CC5C7}" type="datetimeFigureOut">
               <a:rPr lang="en-US" smtClean="0"/>
-              <a:t>10/26/2021</a:t>
+              <a:t>10/31/21</a:t>
             </a:fld>
             <a:endParaRPr lang="en-US"/>
           </a:p>
@@ -4643,7 +4645,7 @@
           <a:p>
             <a:fld id="{8C28A28C-4C6A-46EA-90C0-4EE0B89CC5C7}" type="datetimeFigureOut">
               <a:rPr lang="en-US" smtClean="0"/>
-              <a:t>10/26/2021</a:t>
+              <a:t>10/31/21</a:t>
             </a:fld>
             <a:endParaRPr lang="en-US"/>
           </a:p>
@@ -5055,7 +5057,7 @@
           <a:p>
             <a:fld id="{8C28A28C-4C6A-46EA-90C0-4EE0B89CC5C7}" type="datetimeFigureOut">
               <a:rPr lang="en-US" smtClean="0"/>
-              <a:t>10/26/2021</a:t>
+              <a:t>10/31/21</a:t>
             </a:fld>
             <a:endParaRPr lang="en-US"/>
           </a:p>
@@ -5196,7 +5198,7 @@
           <a:p>
             <a:fld id="{8C28A28C-4C6A-46EA-90C0-4EE0B89CC5C7}" type="datetimeFigureOut">
               <a:rPr lang="en-US" smtClean="0"/>
-              <a:t>10/26/2021</a:t>
+              <a:t>10/31/21</a:t>
             </a:fld>
             <a:endParaRPr lang="en-US"/>
           </a:p>
@@ -5309,7 +5311,7 @@
           <a:p>
             <a:fld id="{8C28A28C-4C6A-46EA-90C0-4EE0B89CC5C7}" type="datetimeFigureOut">
               <a:rPr lang="en-US" smtClean="0"/>
-              <a:t>10/26/2021</a:t>
+              <a:t>10/31/21</a:t>
             </a:fld>
             <a:endParaRPr lang="en-US"/>
           </a:p>
@@ -5622,7 +5624,7 @@
           <a:p>
             <a:fld id="{8C28A28C-4C6A-46EA-90C0-4EE0B89CC5C7}" type="datetimeFigureOut">
               <a:rPr lang="en-US" smtClean="0"/>
-              <a:t>10/26/2021</a:t>
+              <a:t>10/31/21</a:t>
             </a:fld>
             <a:endParaRPr lang="en-US"/>
           </a:p>
@@ -5910,7 +5912,7 @@
           <a:p>
             <a:fld id="{8C28A28C-4C6A-46EA-90C0-4EE0B89CC5C7}" type="datetimeFigureOut">
               <a:rPr lang="en-US" smtClean="0"/>
-              <a:t>10/26/2021</a:t>
+              <a:t>10/31/21</a:t>
             </a:fld>
             <a:endParaRPr lang="en-US"/>
           </a:p>
@@ -6265,7 +6267,7 @@
             <a:fld id="{8C28A28C-4C6A-46EA-90C0-4EE0B89CC5C7}" type="datetimeFigureOut">
               <a:rPr lang="en-US" smtClean="0"/>
               <a:pPr/>
-              <a:t>10/26/2021</a:t>
+              <a:t>10/31/21</a:t>
             </a:fld>
             <a:endParaRPr lang="en-US" dirty="0"/>
           </a:p>
@@ -7841,14 +7843,14 @@
             <p:ph idx="1"/>
             <p:extLst>
               <p:ext uri="{D42A27DB-BD31-4B8C-83A1-F6EECF244321}">
-                <p14:modId xmlns:p14="http://schemas.microsoft.com/office/powerpoint/2010/main" val="3203511161"/>
+                <p14:modId xmlns:p14="http://schemas.microsoft.com/office/powerpoint/2010/main" val="3215872556"/>
               </p:ext>
             </p:extLst>
           </p:nvPr>
         </p:nvGraphicFramePr>
         <p:xfrm>
           <a:off x="1077913" y="2427288"/>
-          <a:ext cx="9778254" cy="2021840"/>
+          <a:ext cx="9778254" cy="2661920"/>
         </p:xfrm>
         <a:graphic>
           <a:graphicData uri="http://schemas.openxmlformats.org/drawingml/2006/table">
@@ -7967,7 +7969,7 @@
                       <a:pPr algn="ctr"/>
                       <a:r>
                         <a:rPr lang="en-GB" b="1" dirty="0"/>
-                        <a:t>JSP</a:t>
+                        <a:t>JSP/WAR</a:t>
                       </a:r>
                     </a:p>
                   </a:txBody>
@@ -8030,10 +8032,9 @@
                     <a:lstStyle/>
                     <a:p>
                       <a:r>
-                        <a:rPr lang="en-GB"/>
+                        <a:rPr lang="en-GB" dirty="0"/>
                         <a:t>API documentation</a:t>
                       </a:r>
-                      <a:endParaRPr lang="en-GB" dirty="0"/>
                     </a:p>
                   </a:txBody>
                   <a:tcPr/>
@@ -8041,6 +8042,40 @@
                 <a:extLst>
                   <a:ext uri="{0D108BD9-81ED-4DB2-BD59-A6C34878D82A}">
                     <a16:rowId xmlns:a16="http://schemas.microsoft.com/office/drawing/2014/main" val="2088855550"/>
+                  </a:ext>
+                </a:extLst>
+              </a:tr>
+              <a:tr h="370840">
+                <a:tc>
+                  <a:txBody>
+                    <a:bodyPr/>
+                    <a:lstStyle/>
+                    <a:p>
+                      <a:pPr algn="ctr"/>
+                      <a:r>
+                        <a:rPr lang="en-GB" b="1" dirty="0"/>
+                        <a:t>Postman</a:t>
+                      </a:r>
+                    </a:p>
+                  </a:txBody>
+                  <a:tcPr/>
+                </a:tc>
+                <a:tc>
+                  <a:txBody>
+                    <a:bodyPr/>
+                    <a:lstStyle/>
+                    <a:p>
+                      <a:r>
+                        <a:rPr lang="en-GB" dirty="0"/>
+                        <a:t>Sending queries to the REST server to ensure the working connection</a:t>
+                      </a:r>
+                    </a:p>
+                  </a:txBody>
+                  <a:tcPr/>
+                </a:tc>
+                <a:extLst>
+                  <a:ext uri="{0D108BD9-81ED-4DB2-BD59-A6C34878D82A}">
+                    <a16:rowId xmlns:a16="http://schemas.microsoft.com/office/drawing/2014/main" val="96236506"/>
                   </a:ext>
                 </a:extLst>
               </a:tr>
@@ -8189,6 +8224,824 @@
 </file>
 
 <file path=ppt/slides/slide7.xml><?xml version="1.0" encoding="utf-8"?>
+<p:sld xmlns:a="http://schemas.openxmlformats.org/drawingml/2006/main" xmlns:r="http://schemas.openxmlformats.org/officeDocument/2006/relationships" xmlns:p="http://schemas.openxmlformats.org/presentationml/2006/main">
+  <p:cSld>
+    <p:spTree>
+      <p:nvGrpSpPr>
+        <p:cNvPr id="1" name=""/>
+        <p:cNvGrpSpPr/>
+        <p:nvPr/>
+      </p:nvGrpSpPr>
+      <p:grpSpPr>
+        <a:xfrm>
+          <a:off x="0" y="0"/>
+          <a:ext cx="0" cy="0"/>
+          <a:chOff x="0" y="0"/>
+          <a:chExt cx="0" cy="0"/>
+        </a:xfrm>
+      </p:grpSpPr>
+      <p:sp>
+        <p:nvSpPr>
+          <p:cNvPr id="2" name="Title 1">
+            <a:extLst>
+              <a:ext uri="{FF2B5EF4-FFF2-40B4-BE49-F238E27FC236}">
+                <a16:creationId xmlns:a16="http://schemas.microsoft.com/office/drawing/2014/main" id="{42E02457-1F6E-864B-BE92-1849C1385466}"/>
+              </a:ext>
+            </a:extLst>
+          </p:cNvPr>
+          <p:cNvSpPr>
+            <a:spLocks noGrp="1"/>
+          </p:cNvSpPr>
+          <p:nvPr>
+            <p:ph type="title"/>
+          </p:nvPr>
+        </p:nvSpPr>
+        <p:spPr/>
+        <p:txBody>
+          <a:bodyPr/>
+          <a:lstStyle/>
+          <a:p>
+            <a:r>
+              <a:rPr lang="en-US" dirty="0"/>
+              <a:t>Deployment Flow &amp; requirements</a:t>
+            </a:r>
+          </a:p>
+        </p:txBody>
+      </p:sp>
+      <p:graphicFrame>
+        <p:nvGraphicFramePr>
+          <p:cNvPr id="4" name="Table 11">
+            <a:extLst>
+              <a:ext uri="{FF2B5EF4-FFF2-40B4-BE49-F238E27FC236}">
+                <a16:creationId xmlns:a16="http://schemas.microsoft.com/office/drawing/2014/main" id="{AF09EAB0-D473-6E44-B818-28C7C6A73C94}"/>
+              </a:ext>
+            </a:extLst>
+          </p:cNvPr>
+          <p:cNvGraphicFramePr>
+            <a:graphicFrameLocks noGrp="1"/>
+          </p:cNvGraphicFramePr>
+          <p:nvPr>
+            <p:ph idx="1"/>
+            <p:extLst>
+              <p:ext uri="{D42A27DB-BD31-4B8C-83A1-F6EECF244321}">
+                <p14:modId xmlns:p14="http://schemas.microsoft.com/office/powerpoint/2010/main" val="1144143710"/>
+              </p:ext>
+            </p:extLst>
+          </p:nvPr>
+        </p:nvGraphicFramePr>
+        <p:xfrm>
+          <a:off x="1077913" y="2427288"/>
+          <a:ext cx="9778254" cy="741680"/>
+        </p:xfrm>
+        <a:graphic>
+          <a:graphicData uri="http://schemas.openxmlformats.org/drawingml/2006/table">
+            <a:tbl>
+              <a:tblPr firstCol="1" bandRow="1">
+                <a:tableStyleId>{5C22544A-7EE6-4342-B048-85BDC9FD1C3A}</a:tableStyleId>
+              </a:tblPr>
+              <a:tblGrid>
+                <a:gridCol w="2728032">
+                  <a:extLst>
+                    <a:ext uri="{9D8B030D-6E8A-4147-A177-3AD203B41FA5}">
+                      <a16:colId xmlns:a16="http://schemas.microsoft.com/office/drawing/2014/main" val="2942096635"/>
+                    </a:ext>
+                  </a:extLst>
+                </a:gridCol>
+                <a:gridCol w="7050222">
+                  <a:extLst>
+                    <a:ext uri="{9D8B030D-6E8A-4147-A177-3AD203B41FA5}">
+                      <a16:colId xmlns:a16="http://schemas.microsoft.com/office/drawing/2014/main" val="2381315393"/>
+                    </a:ext>
+                  </a:extLst>
+                </a:gridCol>
+              </a:tblGrid>
+              <a:tr h="370840">
+                <a:tc>
+                  <a:txBody>
+                    <a:bodyPr/>
+                    <a:lstStyle/>
+                    <a:p>
+                      <a:pPr algn="ctr"/>
+                      <a:r>
+                        <a:rPr lang="en-GB" sz="1800" b="1" kern="1200" dirty="0">
+                          <a:solidFill>
+                            <a:schemeClr val="lt1"/>
+                          </a:solidFill>
+                          <a:effectLst/>
+                          <a:latin typeface="+mn-lt"/>
+                          <a:ea typeface="+mn-ea"/>
+                          <a:cs typeface="+mn-cs"/>
+                        </a:rPr>
+                        <a:t>GitHub</a:t>
+                      </a:r>
+                      <a:endParaRPr lang="en-GB" b="1" dirty="0"/>
+                    </a:p>
+                  </a:txBody>
+                  <a:tcPr/>
+                </a:tc>
+                <a:tc>
+                  <a:txBody>
+                    <a:bodyPr/>
+                    <a:lstStyle/>
+                    <a:p>
+                      <a:endParaRPr lang="en-GB" dirty="0"/>
+                    </a:p>
+                  </a:txBody>
+                  <a:tcPr/>
+                </a:tc>
+                <a:extLst>
+                  <a:ext uri="{0D108BD9-81ED-4DB2-BD59-A6C34878D82A}">
+                    <a16:rowId xmlns:a16="http://schemas.microsoft.com/office/drawing/2014/main" val="4012133355"/>
+                  </a:ext>
+                </a:extLst>
+              </a:tr>
+              <a:tr h="370840">
+                <a:tc>
+                  <a:txBody>
+                    <a:bodyPr/>
+                    <a:lstStyle/>
+                    <a:p>
+                      <a:pPr algn="ctr"/>
+                      <a:r>
+                        <a:rPr lang="en-GB" b="1" dirty="0"/>
+                        <a:t>Actions script</a:t>
+                      </a:r>
+                    </a:p>
+                  </a:txBody>
+                  <a:tcPr/>
+                </a:tc>
+                <a:tc>
+                  <a:txBody>
+                    <a:bodyPr/>
+                    <a:lstStyle/>
+                    <a:p>
+                      <a:endParaRPr lang="en-GB" dirty="0"/>
+                    </a:p>
+                  </a:txBody>
+                  <a:tcPr/>
+                </a:tc>
+                <a:extLst>
+                  <a:ext uri="{0D108BD9-81ED-4DB2-BD59-A6C34878D82A}">
+                    <a16:rowId xmlns:a16="http://schemas.microsoft.com/office/drawing/2014/main" val="1848279034"/>
+                  </a:ext>
+                </a:extLst>
+              </a:tr>
+            </a:tbl>
+          </a:graphicData>
+        </a:graphic>
+      </p:graphicFrame>
+    </p:spTree>
+    <p:extLst>
+      <p:ext uri="{BB962C8B-B14F-4D97-AF65-F5344CB8AC3E}">
+        <p14:creationId xmlns:p14="http://schemas.microsoft.com/office/powerpoint/2010/main" val="1069542233"/>
+      </p:ext>
+    </p:extLst>
+  </p:cSld>
+  <p:clrMapOvr>
+    <a:masterClrMapping/>
+  </p:clrMapOvr>
+</p:sld>
+</file>
+
+<file path=ppt/slides/slide8.xml><?xml version="1.0" encoding="utf-8"?>
+<p:sld xmlns:a="http://schemas.openxmlformats.org/drawingml/2006/main" xmlns:r="http://schemas.openxmlformats.org/officeDocument/2006/relationships" xmlns:p="http://schemas.openxmlformats.org/presentationml/2006/main">
+  <p:cSld>
+    <p:bg>
+      <p:bgPr>
+        <a:solidFill>
+          <a:schemeClr val="bg1"/>
+        </a:solidFill>
+        <a:effectLst/>
+      </p:bgPr>
+    </p:bg>
+    <p:spTree>
+      <p:nvGrpSpPr>
+        <p:cNvPr id="1" name=""/>
+        <p:cNvGrpSpPr/>
+        <p:nvPr/>
+      </p:nvGrpSpPr>
+      <p:grpSpPr>
+        <a:xfrm>
+          <a:off x="0" y="0"/>
+          <a:ext cx="0" cy="0"/>
+          <a:chOff x="0" y="0"/>
+          <a:chExt cx="0" cy="0"/>
+        </a:xfrm>
+      </p:grpSpPr>
+      <p:sp useBgFill="1">
+        <p:nvSpPr>
+          <p:cNvPr id="17" name="Rectangle 9">
+            <a:extLst>
+              <a:ext uri="{FF2B5EF4-FFF2-40B4-BE49-F238E27FC236}">
+                <a16:creationId xmlns:a16="http://schemas.microsoft.com/office/drawing/2014/main" id="{7DC12D2C-21A1-44CF-BA29-D0EE453AB701}"/>
+              </a:ext>
+              <a:ext uri="{C183D7F6-B498-43B3-948B-1728B52AA6E4}">
+                <adec:decorative xmlns:adec="http://schemas.microsoft.com/office/drawing/2017/decorative" val="1"/>
+              </a:ext>
+            </a:extLst>
+          </p:cNvPr>
+          <p:cNvSpPr>
+            <a:spLocks noGrp="1" noRot="1" noChangeAspect="1" noMove="1" noResize="1" noEditPoints="1" noAdjustHandles="1" noChangeArrowheads="1" noChangeShapeType="1" noTextEdit="1"/>
+          </p:cNvSpPr>
+          <p:nvPr>
+            <p:extLst>
+              <p:ext uri="{386F3935-93C4-4BCD-93E2-E3B085C9AB24}">
+                <p16:designElem xmlns:p16="http://schemas.microsoft.com/office/powerpoint/2015/main" val="1"/>
+              </p:ext>
+            </p:extLst>
+          </p:nvPr>
+        </p:nvSpPr>
+        <p:spPr>
+          <a:xfrm>
+            <a:off x="0" y="0"/>
+            <a:ext cx="12192000" cy="6858000"/>
+          </a:xfrm>
+          <a:prstGeom prst="rect">
+            <a:avLst/>
+          </a:prstGeom>
+          <a:ln w="12700" cap="flat" cmpd="sng" algn="ctr">
+            <a:noFill/>
+            <a:prstDash val="solid"/>
+            <a:miter lim="800000"/>
+          </a:ln>
+          <a:effectLst/>
+          <a:extLst>
+            <a:ext uri="{91240B29-F687-4F45-9708-019B960494DF}">
+              <a14:hiddenLine xmlns:a14="http://schemas.microsoft.com/office/drawing/2010/main" w="12700" cap="flat" cmpd="sng" algn="ctr">
+                <a:solidFill>
+                  <a:schemeClr val="accent1">
+                    <a:shade val="50000"/>
+                  </a:schemeClr>
+                </a:solidFill>
+                <a:prstDash val="solid"/>
+                <a:miter lim="800000"/>
+              </a14:hiddenLine>
+            </a:ext>
+          </a:extLst>
+        </p:spPr>
+        <p:style>
+          <a:lnRef idx="2">
+            <a:schemeClr val="accent1">
+              <a:shade val="50000"/>
+            </a:schemeClr>
+          </a:lnRef>
+          <a:fillRef idx="1">
+            <a:schemeClr val="accent1"/>
+          </a:fillRef>
+          <a:effectRef idx="0">
+            <a:schemeClr val="accent1"/>
+          </a:effectRef>
+          <a:fontRef idx="minor">
+            <a:schemeClr val="lt1"/>
+          </a:fontRef>
+        </p:style>
+        <p:txBody>
+          <a:bodyPr rtlCol="0" anchor="ctr"/>
+          <a:lstStyle/>
+          <a:p>
+            <a:pPr algn="ctr"/>
+            <a:endParaRPr lang="en-US"/>
+          </a:p>
+        </p:txBody>
+      </p:sp>
+      <p:sp>
+        <p:nvSpPr>
+          <p:cNvPr id="2" name="Title 1">
+            <a:extLst>
+              <a:ext uri="{FF2B5EF4-FFF2-40B4-BE49-F238E27FC236}">
+                <a16:creationId xmlns:a16="http://schemas.microsoft.com/office/drawing/2014/main" id="{42E02457-1F6E-864B-BE92-1849C1385466}"/>
+              </a:ext>
+            </a:extLst>
+          </p:cNvPr>
+          <p:cNvSpPr>
+            <a:spLocks noGrp="1"/>
+          </p:cNvSpPr>
+          <p:nvPr>
+            <p:ph type="title"/>
+          </p:nvPr>
+        </p:nvSpPr>
+        <p:spPr>
+          <a:xfrm>
+            <a:off x="1077363" y="4084869"/>
+            <a:ext cx="3439876" cy="2005151"/>
+          </a:xfrm>
+        </p:spPr>
+        <p:txBody>
+          <a:bodyPr anchor="t">
+            <a:normAutofit/>
+          </a:bodyPr>
+          <a:lstStyle/>
+          <a:p>
+            <a:r>
+              <a:rPr lang="en-US" dirty="0"/>
+              <a:t>Deployment Flow &amp; requirements</a:t>
+            </a:r>
+          </a:p>
+        </p:txBody>
+      </p:sp>
+      <p:sp>
+        <p:nvSpPr>
+          <p:cNvPr id="18" name="Rectangle 11">
+            <a:extLst>
+              <a:ext uri="{FF2B5EF4-FFF2-40B4-BE49-F238E27FC236}">
+                <a16:creationId xmlns:a16="http://schemas.microsoft.com/office/drawing/2014/main" id="{95598DD8-827C-48DB-AD4F-AEBB72483D50}"/>
+              </a:ext>
+              <a:ext uri="{C183D7F6-B498-43B3-948B-1728B52AA6E4}">
+                <adec:decorative xmlns:adec="http://schemas.microsoft.com/office/drawing/2017/decorative" val="1"/>
+              </a:ext>
+            </a:extLst>
+          </p:cNvPr>
+          <p:cNvSpPr>
+            <a:spLocks noGrp="1" noRot="1" noChangeAspect="1" noMove="1" noResize="1" noEditPoints="1" noAdjustHandles="1" noChangeArrowheads="1" noChangeShapeType="1" noTextEdit="1"/>
+          </p:cNvSpPr>
+          <p:nvPr>
+            <p:extLst>
+              <p:ext uri="{386F3935-93C4-4BCD-93E2-E3B085C9AB24}">
+                <p16:designElem xmlns:p16="http://schemas.microsoft.com/office/powerpoint/2015/main" val="1"/>
+              </p:ext>
+            </p:extLst>
+          </p:nvPr>
+        </p:nvSpPr>
+        <p:spPr>
+          <a:xfrm rot="10800000">
+            <a:off x="-1" y="-1557"/>
+            <a:ext cx="5223349" cy="3420239"/>
+          </a:xfrm>
+          <a:prstGeom prst="rect">
+            <a:avLst/>
+          </a:prstGeom>
+          <a:solidFill>
+            <a:schemeClr val="accent1">
+              <a:lumMod val="60000"/>
+              <a:lumOff val="40000"/>
+            </a:schemeClr>
+          </a:solidFill>
+          <a:ln>
+            <a:noFill/>
+          </a:ln>
+        </p:spPr>
+        <p:style>
+          <a:lnRef idx="2">
+            <a:schemeClr val="accent1">
+              <a:shade val="50000"/>
+            </a:schemeClr>
+          </a:lnRef>
+          <a:fillRef idx="1">
+            <a:schemeClr val="accent1"/>
+          </a:fillRef>
+          <a:effectRef idx="0">
+            <a:schemeClr val="accent1"/>
+          </a:effectRef>
+          <a:fontRef idx="minor">
+            <a:schemeClr val="lt1"/>
+          </a:fontRef>
+        </p:style>
+        <p:txBody>
+          <a:bodyPr rtlCol="0" anchor="ctr"/>
+          <a:lstStyle/>
+          <a:p>
+            <a:pPr algn="ctr"/>
+            <a:endParaRPr lang="en-US"/>
+          </a:p>
+        </p:txBody>
+      </p:sp>
+      <p:sp>
+        <p:nvSpPr>
+          <p:cNvPr id="19" name="Rectangle 34">
+            <a:extLst>
+              <a:ext uri="{FF2B5EF4-FFF2-40B4-BE49-F238E27FC236}">
+                <a16:creationId xmlns:a16="http://schemas.microsoft.com/office/drawing/2014/main" id="{EB40E5E0-6677-497A-8E9D-E8575E276FA0}"/>
+              </a:ext>
+              <a:ext uri="{C183D7F6-B498-43B3-948B-1728B52AA6E4}">
+                <adec:decorative xmlns:adec="http://schemas.microsoft.com/office/drawing/2017/decorative" val="1"/>
+              </a:ext>
+            </a:extLst>
+          </p:cNvPr>
+          <p:cNvSpPr>
+            <a:spLocks noGrp="1" noRot="1" noChangeAspect="1" noMove="1" noResize="1" noEditPoints="1" noAdjustHandles="1" noChangeArrowheads="1" noChangeShapeType="1" noTextEdit="1"/>
+          </p:cNvSpPr>
+          <p:nvPr>
+            <p:extLst>
+              <p:ext uri="{386F3935-93C4-4BCD-93E2-E3B085C9AB24}">
+                <p16:designElem xmlns:p16="http://schemas.microsoft.com/office/powerpoint/2015/main" val="1"/>
+              </p:ext>
+            </p:extLst>
+          </p:nvPr>
+        </p:nvSpPr>
+        <p:spPr>
+          <a:xfrm rot="10800000">
+            <a:off x="1783473" y="3856"/>
+            <a:ext cx="3439876" cy="3414827"/>
+          </a:xfrm>
+          <a:custGeom>
+            <a:avLst/>
+            <a:gdLst>
+              <a:gd name="connsiteX0" fmla="*/ 0 w 3484819"/>
+              <a:gd name="connsiteY0" fmla="*/ 0 h 3430264"/>
+              <a:gd name="connsiteX1" fmla="*/ 3484819 w 3484819"/>
+              <a:gd name="connsiteY1" fmla="*/ 0 h 3430264"/>
+              <a:gd name="connsiteX2" fmla="*/ 3484819 w 3484819"/>
+              <a:gd name="connsiteY2" fmla="*/ 3430264 h 3430264"/>
+              <a:gd name="connsiteX3" fmla="*/ 0 w 3484819"/>
+              <a:gd name="connsiteY3" fmla="*/ 3430264 h 3430264"/>
+              <a:gd name="connsiteX4" fmla="*/ 0 w 3484819"/>
+              <a:gd name="connsiteY4" fmla="*/ 0 h 3430264"/>
+              <a:gd name="connsiteX0" fmla="*/ 0 w 3484819"/>
+              <a:gd name="connsiteY0" fmla="*/ 0 h 3430264"/>
+              <a:gd name="connsiteX1" fmla="*/ 3484819 w 3484819"/>
+              <a:gd name="connsiteY1" fmla="*/ 0 h 3430264"/>
+              <a:gd name="connsiteX2" fmla="*/ 0 w 3484819"/>
+              <a:gd name="connsiteY2" fmla="*/ 3430264 h 3430264"/>
+              <a:gd name="connsiteX3" fmla="*/ 0 w 3484819"/>
+              <a:gd name="connsiteY3" fmla="*/ 0 h 3430264"/>
+            </a:gdLst>
+            <a:ahLst/>
+            <a:cxnLst>
+              <a:cxn ang="0">
+                <a:pos x="connsiteX0" y="connsiteY0"/>
+              </a:cxn>
+              <a:cxn ang="0">
+                <a:pos x="connsiteX1" y="connsiteY1"/>
+              </a:cxn>
+              <a:cxn ang="0">
+                <a:pos x="connsiteX2" y="connsiteY2"/>
+              </a:cxn>
+              <a:cxn ang="0">
+                <a:pos x="connsiteX3" y="connsiteY3"/>
+              </a:cxn>
+            </a:cxnLst>
+            <a:rect l="l" t="t" r="r" b="b"/>
+            <a:pathLst>
+              <a:path w="3484819" h="3430264">
+                <a:moveTo>
+                  <a:pt x="0" y="0"/>
+                </a:moveTo>
+                <a:lnTo>
+                  <a:pt x="3484819" y="0"/>
+                </a:lnTo>
+                <a:lnTo>
+                  <a:pt x="0" y="3430264"/>
+                </a:lnTo>
+                <a:lnTo>
+                  <a:pt x="0" y="0"/>
+                </a:lnTo>
+                <a:close/>
+              </a:path>
+            </a:pathLst>
+          </a:custGeom>
+          <a:solidFill>
+            <a:schemeClr val="accent4">
+              <a:lumMod val="40000"/>
+              <a:lumOff val="60000"/>
+            </a:schemeClr>
+          </a:solidFill>
+          <a:ln>
+            <a:noFill/>
+          </a:ln>
+        </p:spPr>
+        <p:style>
+          <a:lnRef idx="2">
+            <a:schemeClr val="accent1">
+              <a:shade val="50000"/>
+            </a:schemeClr>
+          </a:lnRef>
+          <a:fillRef idx="1">
+            <a:schemeClr val="accent1"/>
+          </a:fillRef>
+          <a:effectRef idx="0">
+            <a:schemeClr val="accent1"/>
+          </a:effectRef>
+          <a:fontRef idx="minor">
+            <a:schemeClr val="lt1"/>
+          </a:fontRef>
+        </p:style>
+        <p:txBody>
+          <a:bodyPr rtlCol="0" anchor="ctr"/>
+          <a:lstStyle/>
+          <a:p>
+            <a:pPr algn="ctr"/>
+            <a:endParaRPr lang="en-US"/>
+          </a:p>
+        </p:txBody>
+      </p:sp>
+      <p:sp>
+        <p:nvSpPr>
+          <p:cNvPr id="16" name="Freeform: Shape 15">
+            <a:extLst>
+              <a:ext uri="{FF2B5EF4-FFF2-40B4-BE49-F238E27FC236}">
+                <a16:creationId xmlns:a16="http://schemas.microsoft.com/office/drawing/2014/main" id="{AC46E49D-1D37-455E-BDA2-28DAF3721470}"/>
+              </a:ext>
+              <a:ext uri="{C183D7F6-B498-43B3-948B-1728B52AA6E4}">
+                <adec:decorative xmlns:adec="http://schemas.microsoft.com/office/drawing/2017/decorative" val="1"/>
+              </a:ext>
+            </a:extLst>
+          </p:cNvPr>
+          <p:cNvSpPr>
+            <a:spLocks noGrp="1" noRot="1" noChangeAspect="1" noMove="1" noResize="1" noEditPoints="1" noAdjustHandles="1" noChangeArrowheads="1" noChangeShapeType="1" noTextEdit="1"/>
+          </p:cNvSpPr>
+          <p:nvPr>
+            <p:extLst>
+              <p:ext uri="{386F3935-93C4-4BCD-93E2-E3B085C9AB24}">
+                <p16:designElem xmlns:p16="http://schemas.microsoft.com/office/powerpoint/2015/main" val="1"/>
+              </p:ext>
+            </p:extLst>
+          </p:nvPr>
+        </p:nvSpPr>
+        <p:spPr>
+          <a:xfrm rot="10800000">
+            <a:off x="8755978" y="-1558"/>
+            <a:ext cx="3439878" cy="3420239"/>
+          </a:xfrm>
+          <a:custGeom>
+            <a:avLst/>
+            <a:gdLst>
+              <a:gd name="connsiteX0" fmla="*/ 3439878 w 3439878"/>
+              <a:gd name="connsiteY0" fmla="*/ 3420239 h 3420239"/>
+              <a:gd name="connsiteX1" fmla="*/ 0 w 3439878"/>
+              <a:gd name="connsiteY1" fmla="*/ 3420239 h 3420239"/>
+              <a:gd name="connsiteX2" fmla="*/ 0 w 3439878"/>
+              <a:gd name="connsiteY2" fmla="*/ 0 h 3420239"/>
+              <a:gd name="connsiteX3" fmla="*/ 3856 w 3439878"/>
+              <a:gd name="connsiteY3" fmla="*/ 0 h 3420239"/>
+              <a:gd name="connsiteX4" fmla="*/ 3856 w 3439878"/>
+              <a:gd name="connsiteY4" fmla="*/ 133338 h 3420239"/>
+              <a:gd name="connsiteX5" fmla="*/ 5641 w 3439878"/>
+              <a:gd name="connsiteY5" fmla="*/ 203263 h 3420239"/>
+              <a:gd name="connsiteX6" fmla="*/ 3347718 w 3439878"/>
+              <a:gd name="connsiteY6" fmla="*/ 3415186 h 3420239"/>
+              <a:gd name="connsiteX7" fmla="*/ 3427612 w 3439878"/>
+              <a:gd name="connsiteY7" fmla="*/ 3417124 h 3420239"/>
+              <a:gd name="connsiteX8" fmla="*/ 3856 w 3439878"/>
+              <a:gd name="connsiteY8" fmla="*/ 3417124 h 3420239"/>
+              <a:gd name="connsiteX9" fmla="*/ 3856 w 3439878"/>
+              <a:gd name="connsiteY9" fmla="*/ 3418681 h 3420239"/>
+              <a:gd name="connsiteX10" fmla="*/ 3439878 w 3439878"/>
+              <a:gd name="connsiteY10" fmla="*/ 3418681 h 3420239"/>
+            </a:gdLst>
+            <a:ahLst/>
+            <a:cxnLst>
+              <a:cxn ang="0">
+                <a:pos x="connsiteX0" y="connsiteY0"/>
+              </a:cxn>
+              <a:cxn ang="0">
+                <a:pos x="connsiteX1" y="connsiteY1"/>
+              </a:cxn>
+              <a:cxn ang="0">
+                <a:pos x="connsiteX2" y="connsiteY2"/>
+              </a:cxn>
+              <a:cxn ang="0">
+                <a:pos x="connsiteX3" y="connsiteY3"/>
+              </a:cxn>
+              <a:cxn ang="0">
+                <a:pos x="connsiteX4" y="connsiteY4"/>
+              </a:cxn>
+              <a:cxn ang="0">
+                <a:pos x="connsiteX5" y="connsiteY5"/>
+              </a:cxn>
+              <a:cxn ang="0">
+                <a:pos x="connsiteX6" y="connsiteY6"/>
+              </a:cxn>
+              <a:cxn ang="0">
+                <a:pos x="connsiteX7" y="connsiteY7"/>
+              </a:cxn>
+              <a:cxn ang="0">
+                <a:pos x="connsiteX8" y="connsiteY8"/>
+              </a:cxn>
+              <a:cxn ang="0">
+                <a:pos x="connsiteX9" y="connsiteY9"/>
+              </a:cxn>
+              <a:cxn ang="0">
+                <a:pos x="connsiteX10" y="connsiteY10"/>
+              </a:cxn>
+            </a:cxnLst>
+            <a:rect l="l" t="t" r="r" b="b"/>
+            <a:pathLst>
+              <a:path w="3439878" h="3420239">
+                <a:moveTo>
+                  <a:pt x="3439878" y="3420239"/>
+                </a:moveTo>
+                <a:lnTo>
+                  <a:pt x="0" y="3420239"/>
+                </a:lnTo>
+                <a:lnTo>
+                  <a:pt x="0" y="0"/>
+                </a:lnTo>
+                <a:lnTo>
+                  <a:pt x="3856" y="0"/>
+                </a:lnTo>
+                <a:lnTo>
+                  <a:pt x="3856" y="133338"/>
+                </a:lnTo>
+                <a:lnTo>
+                  <a:pt x="5641" y="203263"/>
+                </a:lnTo>
+                <a:cubicBezTo>
+                  <a:pt x="94351" y="1936677"/>
+                  <a:pt x="1541917" y="3327355"/>
+                  <a:pt x="3347718" y="3415186"/>
+                </a:cubicBezTo>
+                <a:lnTo>
+                  <a:pt x="3427612" y="3417124"/>
+                </a:lnTo>
+                <a:lnTo>
+                  <a:pt x="3856" y="3417124"/>
+                </a:lnTo>
+                <a:lnTo>
+                  <a:pt x="3856" y="3418681"/>
+                </a:lnTo>
+                <a:lnTo>
+                  <a:pt x="3439878" y="3418681"/>
+                </a:lnTo>
+                <a:close/>
+              </a:path>
+            </a:pathLst>
+          </a:custGeom>
+          <a:solidFill>
+            <a:schemeClr val="accent1"/>
+          </a:solidFill>
+          <a:ln>
+            <a:noFill/>
+          </a:ln>
+        </p:spPr>
+        <p:style>
+          <a:lnRef idx="2">
+            <a:schemeClr val="accent1">
+              <a:shade val="50000"/>
+            </a:schemeClr>
+          </a:lnRef>
+          <a:fillRef idx="1">
+            <a:schemeClr val="accent1"/>
+          </a:fillRef>
+          <a:effectRef idx="0">
+            <a:schemeClr val="accent1"/>
+          </a:effectRef>
+          <a:fontRef idx="minor">
+            <a:schemeClr val="lt1"/>
+          </a:fontRef>
+        </p:style>
+        <p:txBody>
+          <a:bodyPr wrap="square" rtlCol="0" anchor="ctr">
+            <a:noAutofit/>
+          </a:bodyPr>
+          <a:lstStyle/>
+          <a:p>
+            <a:pPr algn="ctr"/>
+            <a:endParaRPr lang="en-US"/>
+          </a:p>
+        </p:txBody>
+      </p:sp>
+      <p:pic>
+        <p:nvPicPr>
+          <p:cNvPr id="5" name="Picture 4" descr="Graphical user interface, application&#10;&#10;Description automatically generated">
+            <a:extLst>
+              <a:ext uri="{FF2B5EF4-FFF2-40B4-BE49-F238E27FC236}">
+                <a16:creationId xmlns:a16="http://schemas.microsoft.com/office/drawing/2014/main" id="{770FA3D7-EEB8-2A41-A3C6-D128910799DF}"/>
+              </a:ext>
+            </a:extLst>
+          </p:cNvPr>
+          <p:cNvPicPr>
+            <a:picLocks noChangeAspect="1"/>
+          </p:cNvPicPr>
+          <p:nvPr/>
+        </p:nvPicPr>
+        <p:blipFill rotWithShape="1">
+          <a:blip r:embed="rId2"/>
+          <a:srcRect r="27552" b="-1"/>
+          <a:stretch/>
+        </p:blipFill>
+        <p:spPr>
+          <a:xfrm>
+            <a:off x="5216651" y="-1558"/>
+            <a:ext cx="6979975" cy="3420240"/>
+          </a:xfrm>
+          <a:custGeom>
+            <a:avLst/>
+            <a:gdLst/>
+            <a:ahLst/>
+            <a:cxnLst/>
+            <a:rect l="l" t="t" r="r" b="b"/>
+            <a:pathLst>
+              <a:path w="6979975" h="3420240">
+                <a:moveTo>
+                  <a:pt x="13648" y="0"/>
+                </a:moveTo>
+                <a:lnTo>
+                  <a:pt x="6979975" y="0"/>
+                </a:lnTo>
+                <a:lnTo>
+                  <a:pt x="6979975" y="1557"/>
+                </a:lnTo>
+                <a:lnTo>
+                  <a:pt x="3556219" y="1557"/>
+                </a:lnTo>
+                <a:lnTo>
+                  <a:pt x="3636113" y="3495"/>
+                </a:lnTo>
+                <a:cubicBezTo>
+                  <a:pt x="5441914" y="91326"/>
+                  <a:pt x="6889480" y="1482004"/>
+                  <a:pt x="6978190" y="3215418"/>
+                </a:cubicBezTo>
+                <a:lnTo>
+                  <a:pt x="6979975" y="3285343"/>
+                </a:lnTo>
+                <a:lnTo>
+                  <a:pt x="6979975" y="3420240"/>
+                </a:lnTo>
+                <a:lnTo>
+                  <a:pt x="13648" y="3420240"/>
+                </a:lnTo>
+                <a:lnTo>
+                  <a:pt x="13648" y="3420238"/>
+                </a:lnTo>
+                <a:lnTo>
+                  <a:pt x="0" y="3420238"/>
+                </a:lnTo>
+                <a:lnTo>
+                  <a:pt x="0" y="1557"/>
+                </a:lnTo>
+                <a:lnTo>
+                  <a:pt x="13648" y="1557"/>
+                </a:lnTo>
+                <a:close/>
+              </a:path>
+            </a:pathLst>
+          </a:custGeom>
+        </p:spPr>
+      </p:pic>
+      <p:sp>
+        <p:nvSpPr>
+          <p:cNvPr id="3" name="Content Placeholder 2">
+            <a:extLst>
+              <a:ext uri="{FF2B5EF4-FFF2-40B4-BE49-F238E27FC236}">
+                <a16:creationId xmlns:a16="http://schemas.microsoft.com/office/drawing/2014/main" id="{5D1E8BAC-12C6-1C45-81E1-FB1DE0F2F3E8}"/>
+              </a:ext>
+            </a:extLst>
+          </p:cNvPr>
+          <p:cNvSpPr>
+            <a:spLocks noGrp="1"/>
+          </p:cNvSpPr>
+          <p:nvPr>
+            <p:ph idx="1"/>
+          </p:nvPr>
+        </p:nvSpPr>
+        <p:spPr>
+          <a:xfrm>
+            <a:off x="5228651" y="4084869"/>
+            <a:ext cx="5885987" cy="2005151"/>
+          </a:xfrm>
+        </p:spPr>
+        <p:txBody>
+          <a:bodyPr>
+            <a:normAutofit/>
+          </a:bodyPr>
+          <a:lstStyle/>
+          <a:p>
+            <a:pPr marL="342900" indent="-342900">
+              <a:buFont typeface="+mj-lt"/>
+              <a:buAutoNum type="arabicPeriod"/>
+            </a:pPr>
+            <a:r>
+              <a:rPr lang="en-US" dirty="0"/>
+              <a:t>The development team creates a new release that triggers the deployment action</a:t>
+            </a:r>
+          </a:p>
+          <a:p>
+            <a:pPr marL="342900" indent="-342900">
+              <a:buFont typeface="+mj-lt"/>
+              <a:buAutoNum type="arabicPeriod"/>
+            </a:pPr>
+            <a:r>
+              <a:rPr lang="en-US" dirty="0"/>
+              <a:t>The deployment action initiates </a:t>
+            </a:r>
+          </a:p>
+          <a:p>
+            <a:pPr marL="342900" indent="-342900">
+              <a:buFont typeface="+mj-lt"/>
+              <a:buAutoNum type="arabicPeriod"/>
+            </a:pPr>
+            <a:r>
+              <a:rPr lang="en-US" dirty="0"/>
+              <a:t>The pre-defined test command expects to succeed </a:t>
+            </a:r>
+          </a:p>
+        </p:txBody>
+      </p:sp>
+    </p:spTree>
+    <p:extLst>
+      <p:ext uri="{BB962C8B-B14F-4D97-AF65-F5344CB8AC3E}">
+        <p14:creationId xmlns:p14="http://schemas.microsoft.com/office/powerpoint/2010/main" val="2658619610"/>
+      </p:ext>
+    </p:extLst>
+  </p:cSld>
+  <p:clrMapOvr>
+    <a:masterClrMapping/>
+  </p:clrMapOvr>
+</p:sld>
+</file>
+
+<file path=ppt/slides/slide9.xml><?xml version="1.0" encoding="utf-8"?>
 <p:sld xmlns:a="http://schemas.openxmlformats.org/drawingml/2006/main" xmlns:r="http://schemas.openxmlformats.org/officeDocument/2006/relationships" xmlns:p="http://schemas.openxmlformats.org/presentationml/2006/main">
   <p:cSld>
     <p:bg>

</xml_diff>

<commit_message>
Sprint2 Presentation grammar check
</commit_message>
<xml_diff>
--- a/documentation/Sprint2_PAA.pptx
+++ b/documentation/Sprint2_PAA.pptx
@@ -2914,7 +2914,7 @@
           <a:p>
             <a:fld id="{5D219B12-85DE-474F-82A6-F2BBEFB2572A}" type="datetimeFigureOut">
               <a:rPr lang="en-GB" smtClean="0"/>
-              <a:t>06/11/2021</a:t>
+              <a:t>08/11/2021</a:t>
             </a:fld>
             <a:endParaRPr lang="en-GB"/>
           </a:p>
@@ -3501,7 +3501,7 @@
           <a:p>
             <a:fld id="{8C28A28C-4C6A-46EA-90C0-4EE0B89CC5C7}" type="datetimeFigureOut">
               <a:rPr lang="en-US" smtClean="0"/>
-              <a:t>11/6/21</a:t>
+              <a:t>11/8/21</a:t>
             </a:fld>
             <a:endParaRPr lang="en-US" dirty="0"/>
           </a:p>
@@ -3699,7 +3699,7 @@
           <a:p>
             <a:fld id="{8C28A28C-4C6A-46EA-90C0-4EE0B89CC5C7}" type="datetimeFigureOut">
               <a:rPr lang="en-US" smtClean="0"/>
-              <a:t>11/6/21</a:t>
+              <a:t>11/8/21</a:t>
             </a:fld>
             <a:endParaRPr lang="en-US"/>
           </a:p>
@@ -3907,7 +3907,7 @@
           <a:p>
             <a:fld id="{8C28A28C-4C6A-46EA-90C0-4EE0B89CC5C7}" type="datetimeFigureOut">
               <a:rPr lang="en-US" smtClean="0"/>
-              <a:t>11/6/21</a:t>
+              <a:t>11/8/21</a:t>
             </a:fld>
             <a:endParaRPr lang="en-US"/>
           </a:p>
@@ -4105,7 +4105,7 @@
           <a:p>
             <a:fld id="{8C28A28C-4C6A-46EA-90C0-4EE0B89CC5C7}" type="datetimeFigureOut">
               <a:rPr lang="en-US" smtClean="0"/>
-              <a:t>11/6/21</a:t>
+              <a:t>11/8/21</a:t>
             </a:fld>
             <a:endParaRPr lang="en-US"/>
           </a:p>
@@ -4382,7 +4382,7 @@
           <a:p>
             <a:fld id="{8C28A28C-4C6A-46EA-90C0-4EE0B89CC5C7}" type="datetimeFigureOut">
               <a:rPr lang="en-US" smtClean="0"/>
-              <a:t>11/6/21</a:t>
+              <a:t>11/8/21</a:t>
             </a:fld>
             <a:endParaRPr lang="en-US"/>
           </a:p>
@@ -4647,7 +4647,7 @@
           <a:p>
             <a:fld id="{8C28A28C-4C6A-46EA-90C0-4EE0B89CC5C7}" type="datetimeFigureOut">
               <a:rPr lang="en-US" smtClean="0"/>
-              <a:t>11/6/21</a:t>
+              <a:t>11/8/21</a:t>
             </a:fld>
             <a:endParaRPr lang="en-US"/>
           </a:p>
@@ -5059,7 +5059,7 @@
           <a:p>
             <a:fld id="{8C28A28C-4C6A-46EA-90C0-4EE0B89CC5C7}" type="datetimeFigureOut">
               <a:rPr lang="en-US" smtClean="0"/>
-              <a:t>11/6/21</a:t>
+              <a:t>11/8/21</a:t>
             </a:fld>
             <a:endParaRPr lang="en-US"/>
           </a:p>
@@ -5200,7 +5200,7 @@
           <a:p>
             <a:fld id="{8C28A28C-4C6A-46EA-90C0-4EE0B89CC5C7}" type="datetimeFigureOut">
               <a:rPr lang="en-US" smtClean="0"/>
-              <a:t>11/6/21</a:t>
+              <a:t>11/8/21</a:t>
             </a:fld>
             <a:endParaRPr lang="en-US"/>
           </a:p>
@@ -5313,7 +5313,7 @@
           <a:p>
             <a:fld id="{8C28A28C-4C6A-46EA-90C0-4EE0B89CC5C7}" type="datetimeFigureOut">
               <a:rPr lang="en-US" smtClean="0"/>
-              <a:t>11/6/21</a:t>
+              <a:t>11/8/21</a:t>
             </a:fld>
             <a:endParaRPr lang="en-US"/>
           </a:p>
@@ -5626,7 +5626,7 @@
           <a:p>
             <a:fld id="{8C28A28C-4C6A-46EA-90C0-4EE0B89CC5C7}" type="datetimeFigureOut">
               <a:rPr lang="en-US" smtClean="0"/>
-              <a:t>11/6/21</a:t>
+              <a:t>11/8/21</a:t>
             </a:fld>
             <a:endParaRPr lang="en-US"/>
           </a:p>
@@ -5914,7 +5914,7 @@
           <a:p>
             <a:fld id="{8C28A28C-4C6A-46EA-90C0-4EE0B89CC5C7}" type="datetimeFigureOut">
               <a:rPr lang="en-US" smtClean="0"/>
-              <a:t>11/6/21</a:t>
+              <a:t>11/8/21</a:t>
             </a:fld>
             <a:endParaRPr lang="en-US"/>
           </a:p>
@@ -6269,7 +6269,7 @@
             <a:fld id="{8C28A28C-4C6A-46EA-90C0-4EE0B89CC5C7}" type="datetimeFigureOut">
               <a:rPr lang="en-US" smtClean="0"/>
               <a:pPr/>
-              <a:t>11/6/21</a:t>
+              <a:t>11/8/21</a:t>
             </a:fld>
             <a:endParaRPr lang="en-US" dirty="0"/>
           </a:p>
@@ -9322,7 +9322,7 @@
             <p:ph idx="1"/>
             <p:extLst>
               <p:ext uri="{D42A27DB-BD31-4B8C-83A1-F6EECF244321}">
-                <p14:modId xmlns:p14="http://schemas.microsoft.com/office/powerpoint/2010/main" val="3215872556"/>
+                <p14:modId xmlns:p14="http://schemas.microsoft.com/office/powerpoint/2010/main" val="1417526913"/>
               </p:ext>
             </p:extLst>
           </p:nvPr>
@@ -9427,8 +9427,13 @@
                     <a:p>
                       <a:r>
                         <a:rPr lang="en-GB" dirty="0"/>
-                        <a:t>The default webserver for Spring Boot, </a:t>
+                        <a:t>The default webserver for </a:t>
                       </a:r>
+                      <a:r>
+                        <a:rPr lang="en-GB"/>
+                        <a:t>Spring Boot</a:t>
+                      </a:r>
+                      <a:endParaRPr lang="en-GB" dirty="0"/>
                     </a:p>
                   </a:txBody>
                   <a:tcPr/>

</xml_diff>

<commit_message>
Shipped the project Sprint deliverables
</commit_message>
<xml_diff>
--- a/documentation/Sprint2_PAA.pptx
+++ b/documentation/Sprint2_PAA.pptx
@@ -8820,7 +8820,39 @@
           <a:bodyPr/>
           <a:lstStyle/>
           <a:p>
-            <a:endParaRPr lang="en-US"/>
+            <a:r>
+              <a:rPr lang="en-US" dirty="0"/>
+              <a:t>Create the API</a:t>
+            </a:r>
+          </a:p>
+          <a:p>
+            <a:r>
+              <a:rPr lang="en-US" dirty="0"/>
+              <a:t>Generate the DB with the dummy dataset</a:t>
+            </a:r>
+          </a:p>
+          <a:p>
+            <a:r>
+              <a:rPr lang="en-US" dirty="0"/>
+              <a:t>Test the CRUD services (Port, Booking, Dock)</a:t>
+            </a:r>
+          </a:p>
+          <a:p>
+            <a:r>
+              <a:rPr lang="en-US" dirty="0"/>
+              <a:t>Develop the application and test the Front-end</a:t>
+            </a:r>
+          </a:p>
+          <a:p>
+            <a:r>
+              <a:rPr lang="en-US" dirty="0"/>
+              <a:t>Test the communication between other external services (Harbormaster, Stevedores</a:t>
+            </a:r>
+            <a:r>
+              <a:rPr lang="en-US"/>
+              <a:t>, Ship owners) </a:t>
+            </a:r>
+            <a:endParaRPr lang="en-US" dirty="0"/>
           </a:p>
         </p:txBody>
       </p:sp>
@@ -8903,7 +8935,25 @@
           <a:bodyPr/>
           <a:lstStyle/>
           <a:p>
-            <a:endParaRPr lang="en-US"/>
+            <a:r>
+              <a:rPr lang="en-US" dirty="0"/>
+              <a:t>The API to other Service to access the data from</a:t>
+            </a:r>
+          </a:p>
+          <a:p>
+            <a:r>
+              <a:rPr lang="en-US" dirty="0"/>
+              <a:t>The FE for booking and change requests</a:t>
+            </a:r>
+          </a:p>
+          <a:p>
+            <a:r>
+              <a:rPr lang="en-US" dirty="0"/>
+              <a:t>The same or separate FE for port and docs CRUD service</a:t>
+            </a:r>
+          </a:p>
+          <a:p>
+            <a:endParaRPr lang="en-US" dirty="0"/>
           </a:p>
         </p:txBody>
       </p:sp>

</xml_diff>

<commit_message>
Updated the presentation feature req
</commit_message>
<xml_diff>
--- a/documentation/Sprint2_PAA.pptx
+++ b/documentation/Sprint2_PAA.pptx
@@ -10,7 +10,7 @@
   <p:sldIdLst>
     <p:sldId id="256" r:id="rId2"/>
     <p:sldId id="265" r:id="rId3"/>
-    <p:sldId id="263" r:id="rId4"/>
+    <p:sldId id="271" r:id="rId4"/>
     <p:sldId id="261" r:id="rId5"/>
     <p:sldId id="266" r:id="rId6"/>
     <p:sldId id="264" r:id="rId7"/>
@@ -8932,35 +8932,200 @@
         </p:nvSpPr>
         <p:spPr/>
         <p:txBody>
-          <a:bodyPr/>
+          <a:bodyPr>
+            <a:normAutofit fontScale="92500" lnSpcReduction="20000"/>
+          </a:bodyPr>
           <a:lstStyle/>
           <a:p>
+            <a:pPr marL="0" indent="0">
+              <a:buNone/>
+            </a:pPr>
+            <a:r>
+              <a:rPr lang="en-GB" dirty="0"/>
+              <a:t>GET 1.1</a:t>
+            </a:r>
+          </a:p>
+          <a:p>
+            <a:r>
+              <a:rPr lang="en-GB" b="1" dirty="0"/>
+              <a:t>/</a:t>
+            </a:r>
+            <a:r>
+              <a:rPr lang="en-GB" b="1" dirty="0" err="1"/>
+              <a:t>api</a:t>
+            </a:r>
+            <a:r>
+              <a:rPr lang="en-GB" b="1" dirty="0"/>
+              <a:t>/</a:t>
+            </a:r>
+            <a:r>
+              <a:rPr lang="en-GB" b="1" dirty="0" err="1"/>
+              <a:t>isBerthAvailable</a:t>
+            </a:r>
+            <a:r>
+              <a:rPr lang="en-GB" dirty="0"/>
+              <a:t> – Is the specific berth available at the given time</a:t>
+            </a:r>
+          </a:p>
+          <a:p>
+            <a:r>
+              <a:rPr lang="en-GB" b="1" dirty="0"/>
+              <a:t>/</a:t>
+            </a:r>
+            <a:r>
+              <a:rPr lang="en-GB" b="1" dirty="0" err="1"/>
+              <a:t>api</a:t>
+            </a:r>
+            <a:r>
+              <a:rPr lang="en-GB" b="1" dirty="0"/>
+              <a:t>/</a:t>
+            </a:r>
+            <a:r>
+              <a:rPr lang="en-GB" b="1" dirty="0" err="1"/>
+              <a:t>getAvailableBerthsList</a:t>
+            </a:r>
+            <a:r>
+              <a:rPr lang="en-GB" b="1" dirty="0"/>
+              <a:t> </a:t>
+            </a:r>
+            <a:r>
+              <a:rPr lang="en-GB" dirty="0"/>
+              <a:t>– Get all available berths</a:t>
+            </a:r>
+          </a:p>
+          <a:p>
+            <a:pPr marL="0" indent="0">
+              <a:buNone/>
+            </a:pPr>
+            <a:endParaRPr lang="en-GB" dirty="0"/>
+          </a:p>
+          <a:p>
+            <a:pPr marL="0" indent="0">
+              <a:buNone/>
+            </a:pPr>
+            <a:r>
+              <a:rPr lang="en-GB" dirty="0"/>
+              <a:t>POST 1.1</a:t>
+            </a:r>
+          </a:p>
+          <a:p>
+            <a:r>
+              <a:rPr lang="en-US" b="1" dirty="0"/>
+              <a:t>/</a:t>
+            </a:r>
+            <a:r>
+              <a:rPr lang="en-US" b="1" dirty="0" err="1"/>
+              <a:t>api</a:t>
+            </a:r>
+            <a:r>
+              <a:rPr lang="en-US" b="1" dirty="0"/>
+              <a:t>/</a:t>
+            </a:r>
+            <a:r>
+              <a:rPr lang="en-US" b="1" dirty="0" err="1"/>
+              <a:t>createPort</a:t>
+            </a:r>
+            <a:r>
+              <a:rPr lang="en-US" b="1" dirty="0"/>
+              <a:t> </a:t>
+            </a:r>
             <a:r>
               <a:rPr lang="en-US" dirty="0"/>
-              <a:t>The API to other Service to access the data from</a:t>
-            </a:r>
-          </a:p>
-          <a:p>
+              <a:t>– </a:t>
+            </a:r>
+            <a:r>
+              <a:rPr lang="en-GB" dirty="0"/>
+              <a:t>Create a new port</a:t>
+            </a:r>
+            <a:endParaRPr lang="en-US" b="1" dirty="0"/>
+          </a:p>
+          <a:p>
+            <a:r>
+              <a:rPr lang="en-US" b="1" dirty="0"/>
+              <a:t>/</a:t>
+            </a:r>
+            <a:r>
+              <a:rPr lang="en-US" b="1" dirty="0" err="1"/>
+              <a:t>api</a:t>
+            </a:r>
+            <a:r>
+              <a:rPr lang="en-US" b="1" dirty="0"/>
+              <a:t>/</a:t>
+            </a:r>
+            <a:r>
+              <a:rPr lang="en-US" b="1" dirty="0" err="1"/>
+              <a:t>createBooking</a:t>
+            </a:r>
+            <a:r>
+              <a:rPr lang="en-US" b="1" dirty="0"/>
+              <a:t> </a:t>
+            </a:r>
             <a:r>
               <a:rPr lang="en-US" dirty="0"/>
-              <a:t>The FE for booking and change requests</a:t>
-            </a:r>
-          </a:p>
-          <a:p>
+              <a:t>– </a:t>
+            </a:r>
+            <a:r>
+              <a:rPr lang="en-GB" dirty="0"/>
+              <a:t>Create a new booking</a:t>
+            </a:r>
+            <a:endParaRPr lang="en-US" b="1" dirty="0"/>
+          </a:p>
+          <a:p>
+            <a:r>
+              <a:rPr lang="en-US" b="1" dirty="0"/>
+              <a:t>/</a:t>
+            </a:r>
+            <a:r>
+              <a:rPr lang="en-US" b="1" dirty="0" err="1"/>
+              <a:t>api</a:t>
+            </a:r>
+            <a:r>
+              <a:rPr lang="en-US" b="1" dirty="0"/>
+              <a:t>/</a:t>
+            </a:r>
+            <a:r>
+              <a:rPr lang="en-US" b="1" dirty="0" err="1"/>
+              <a:t>updateBooking</a:t>
+            </a:r>
+            <a:r>
+              <a:rPr lang="en-US" b="1" dirty="0"/>
+              <a:t> </a:t>
+            </a:r>
             <a:r>
               <a:rPr lang="en-US" dirty="0"/>
-              <a:t>The same or separate FE for port and docs CRUD service</a:t>
-            </a:r>
-          </a:p>
-          <a:p>
-            <a:endParaRPr lang="en-US" dirty="0"/>
+              <a:t>– Update the existing booking</a:t>
+            </a:r>
+            <a:endParaRPr lang="en-US" b="1" dirty="0"/>
+          </a:p>
+          <a:p>
+            <a:r>
+              <a:rPr lang="en-US" b="1" dirty="0"/>
+              <a:t>/</a:t>
+            </a:r>
+            <a:r>
+              <a:rPr lang="en-US" b="1" dirty="0" err="1"/>
+              <a:t>api</a:t>
+            </a:r>
+            <a:r>
+              <a:rPr lang="en-US" b="1" dirty="0"/>
+              <a:t>/</a:t>
+            </a:r>
+            <a:r>
+              <a:rPr lang="en-US" b="1" dirty="0" err="1"/>
+              <a:t>cancelBooking</a:t>
+            </a:r>
+            <a:r>
+              <a:rPr lang="en-US" dirty="0"/>
+              <a:t> – Cancel the existing booking</a:t>
+            </a:r>
+            <a:endParaRPr lang="en-US" b="1" dirty="0"/>
           </a:p>
         </p:txBody>
       </p:sp>
     </p:spTree>
     <p:extLst>
       <p:ext uri="{BB962C8B-B14F-4D97-AF65-F5344CB8AC3E}">
-        <p14:creationId xmlns:p14="http://schemas.microsoft.com/office/powerpoint/2010/main" val="3568765830"/>
+        <p14:creationId xmlns:p14="http://schemas.microsoft.com/office/powerpoint/2010/main" val="1763572795"/>
       </p:ext>
     </p:extLst>
   </p:cSld>
@@ -9776,7 +9941,7 @@
           <a:p>
             <a:r>
               <a:rPr lang="en-US" dirty="0"/>
-              <a:t>Does the application build successfully and does not contain any broken code or packages</a:t>
+              <a:t>Does the application build successfully and does not contain any broken code or packages (Linting, etc.)</a:t>
             </a:r>
           </a:p>
         </p:txBody>

</xml_diff>